<commit_message>
Added material to the poster
</commit_message>
<xml_diff>
--- a/GPUposter.pptx
+++ b/GPUposter.pptx
@@ -113,23 +113,31 @@
 </p:presentation>
 </file>
 
+<file path=ppt/revisionInfo.xml><?xml version="1.0" encoding="utf-8"?>
+<p1510:revInfo xmlns:a="http://schemas.openxmlformats.org/drawingml/2006/main" xmlns:r="http://schemas.openxmlformats.org/officeDocument/2006/relationships" xmlns:p1510="http://schemas.microsoft.com/office/powerpoint/2015/10/main">
+  <p1510:revLst>
+    <p1510:client id="{1F159CE9-0C05-485B-AFE6-EFA870FA0FA4}" v="352" dt="2024-06-04T18:29:46.020"/>
+  </p1510:revLst>
+</p1510:revInfo>
+</file>
+
 <file path=ppt/changesInfos/changesInfo1.xml><?xml version="1.0" encoding="utf-8"?>
 <pc:chgInfo xmlns:a="http://schemas.openxmlformats.org/drawingml/2006/main" xmlns:r="http://schemas.openxmlformats.org/officeDocument/2006/relationships" xmlns:ac="http://schemas.microsoft.com/office/drawing/2013/main/command" xmlns:pc="http://schemas.microsoft.com/office/powerpoint/2013/main/command">
   <pc:docChgLst>
     <pc:chgData name="Emanuel Herberthson" userId="79fb5b5fc78ea11e" providerId="LiveId" clId="{1F159CE9-0C05-485B-AFE6-EFA870FA0FA4}"/>
-    <pc:docChg chg="custSel modSld">
-      <pc:chgData name="Emanuel Herberthson" userId="79fb5b5fc78ea11e" providerId="LiveId" clId="{1F159CE9-0C05-485B-AFE6-EFA870FA0FA4}" dt="2024-06-04T16:36:52.958" v="200" actId="20577"/>
+    <pc:docChg chg="undo redo custSel modSld">
+      <pc:chgData name="Emanuel Herberthson" userId="79fb5b5fc78ea11e" providerId="LiveId" clId="{1F159CE9-0C05-485B-AFE6-EFA870FA0FA4}" dt="2024-06-04T18:31:20.141" v="2992" actId="20577"/>
       <pc:docMkLst>
         <pc:docMk/>
       </pc:docMkLst>
       <pc:sldChg chg="delSp modSp mod">
-        <pc:chgData name="Emanuel Herberthson" userId="79fb5b5fc78ea11e" providerId="LiveId" clId="{1F159CE9-0C05-485B-AFE6-EFA870FA0FA4}" dt="2024-06-04T16:36:52.958" v="200" actId="20577"/>
+        <pc:chgData name="Emanuel Herberthson" userId="79fb5b5fc78ea11e" providerId="LiveId" clId="{1F159CE9-0C05-485B-AFE6-EFA870FA0FA4}" dt="2024-06-04T16:56:03.171" v="267" actId="1076"/>
         <pc:sldMkLst>
           <pc:docMk/>
           <pc:sldMk cId="1386278785" sldId="258"/>
         </pc:sldMkLst>
         <pc:spChg chg="mod">
-          <ac:chgData name="Emanuel Herberthson" userId="79fb5b5fc78ea11e" providerId="LiveId" clId="{1F159CE9-0C05-485B-AFE6-EFA870FA0FA4}" dt="2024-06-04T16:36:52.958" v="200" actId="20577"/>
+          <ac:chgData name="Emanuel Herberthson" userId="79fb5b5fc78ea11e" providerId="LiveId" clId="{1F159CE9-0C05-485B-AFE6-EFA870FA0FA4}" dt="2024-06-04T16:56:03.171" v="267" actId="1076"/>
           <ac:spMkLst>
             <pc:docMk/>
             <pc:sldMk cId="1386278785" sldId="258"/>
@@ -145,7 +153,7 @@
           </ac:spMkLst>
         </pc:spChg>
         <pc:spChg chg="mod">
-          <ac:chgData name="Emanuel Herberthson" userId="79fb5b5fc78ea11e" providerId="LiveId" clId="{1F159CE9-0C05-485B-AFE6-EFA870FA0FA4}" dt="2024-06-04T16:36:18.160" v="154" actId="20577"/>
+          <ac:chgData name="Emanuel Herberthson" userId="79fb5b5fc78ea11e" providerId="LiveId" clId="{1F159CE9-0C05-485B-AFE6-EFA870FA0FA4}" dt="2024-06-04T16:55:03.851" v="228"/>
           <ac:spMkLst>
             <pc:docMk/>
             <pc:sldMk cId="1386278785" sldId="258"/>
@@ -153,7 +161,7 @@
           </ac:spMkLst>
         </pc:spChg>
         <pc:spChg chg="mod">
-          <ac:chgData name="Emanuel Herberthson" userId="79fb5b5fc78ea11e" providerId="LiveId" clId="{1F159CE9-0C05-485B-AFE6-EFA870FA0FA4}" dt="2024-06-04T16:36:10.235" v="151" actId="20577"/>
+          <ac:chgData name="Emanuel Herberthson" userId="79fb5b5fc78ea11e" providerId="LiveId" clId="{1F159CE9-0C05-485B-AFE6-EFA870FA0FA4}" dt="2024-06-04T16:55:11.946" v="229"/>
           <ac:spMkLst>
             <pc:docMk/>
             <pc:sldMk cId="1386278785" sldId="258"/>
@@ -168,6 +176,341 @@
             <ac:spMk id="39" creationId="{49741301-AFA9-8F45-BB67-4B379BDD3140}"/>
           </ac:spMkLst>
         </pc:spChg>
+        <pc:spChg chg="del mod">
+          <ac:chgData name="Emanuel Herberthson" userId="79fb5b5fc78ea11e" providerId="LiveId" clId="{1F159CE9-0C05-485B-AFE6-EFA870FA0FA4}" dt="2024-06-04T16:48:33.097" v="203"/>
+          <ac:spMkLst>
+            <pc:docMk/>
+            <pc:sldMk cId="1386278785" sldId="258"/>
+            <ac:spMk id="75" creationId="{54EEA09E-11F0-A54C-9909-790F4A6B807C}"/>
+          </ac:spMkLst>
+        </pc:spChg>
+      </pc:sldChg>
+      <pc:sldChg chg="addSp delSp modSp mod">
+        <pc:chgData name="Emanuel Herberthson" userId="79fb5b5fc78ea11e" providerId="LiveId" clId="{1F159CE9-0C05-485B-AFE6-EFA870FA0FA4}" dt="2024-06-04T18:31:20.141" v="2992" actId="20577"/>
+        <pc:sldMkLst>
+          <pc:docMk/>
+          <pc:sldMk cId="3173212375" sldId="259"/>
+        </pc:sldMkLst>
+        <pc:spChg chg="add del mod">
+          <ac:chgData name="Emanuel Herberthson" userId="79fb5b5fc78ea11e" providerId="LiveId" clId="{1F159CE9-0C05-485B-AFE6-EFA870FA0FA4}" dt="2024-06-04T17:07:29.261" v="481"/>
+          <ac:spMkLst>
+            <pc:docMk/>
+            <pc:sldMk cId="3173212375" sldId="259"/>
+            <ac:spMk id="3" creationId="{B6DC4471-8FBE-AA1B-7ABE-3F40DD603ED8}"/>
+          </ac:spMkLst>
+        </pc:spChg>
+        <pc:spChg chg="add mod">
+          <ac:chgData name="Emanuel Herberthson" userId="79fb5b5fc78ea11e" providerId="LiveId" clId="{1F159CE9-0C05-485B-AFE6-EFA870FA0FA4}" dt="2024-06-04T17:13:52.171" v="993" actId="14100"/>
+          <ac:spMkLst>
+            <pc:docMk/>
+            <pc:sldMk cId="3173212375" sldId="259"/>
+            <ac:spMk id="5" creationId="{803AF0D2-874C-6586-A371-A829CE4579B2}"/>
+          </ac:spMkLst>
+        </pc:spChg>
+        <pc:spChg chg="mod">
+          <ac:chgData name="Emanuel Herberthson" userId="79fb5b5fc78ea11e" providerId="LiveId" clId="{1F159CE9-0C05-485B-AFE6-EFA870FA0FA4}" dt="2024-06-04T17:59:58.206" v="1936" actId="20577"/>
+          <ac:spMkLst>
+            <pc:docMk/>
+            <pc:sldMk cId="3173212375" sldId="259"/>
+            <ac:spMk id="9" creationId="{13742041-92E4-C2BB-7B8D-3E53B4C31D1D}"/>
+          </ac:spMkLst>
+        </pc:spChg>
+        <pc:spChg chg="mod">
+          <ac:chgData name="Emanuel Herberthson" userId="79fb5b5fc78ea11e" providerId="LiveId" clId="{1F159CE9-0C05-485B-AFE6-EFA870FA0FA4}" dt="2024-06-04T16:59:14.192" v="443" actId="20577"/>
+          <ac:spMkLst>
+            <pc:docMk/>
+            <pc:sldMk cId="3173212375" sldId="259"/>
+            <ac:spMk id="10" creationId="{C2C6E47B-ACAE-754C-9334-40DA8E355574}"/>
+          </ac:spMkLst>
+        </pc:spChg>
+        <pc:spChg chg="mod">
+          <ac:chgData name="Emanuel Herberthson" userId="79fb5b5fc78ea11e" providerId="LiveId" clId="{1F159CE9-0C05-485B-AFE6-EFA870FA0FA4}" dt="2024-06-04T16:56:32.927" v="279" actId="14100"/>
+          <ac:spMkLst>
+            <pc:docMk/>
+            <pc:sldMk cId="3173212375" sldId="259"/>
+            <ac:spMk id="11" creationId="{2F80E265-3791-4345-A501-7B4BF1893D75}"/>
+          </ac:spMkLst>
+        </pc:spChg>
+        <pc:spChg chg="mod">
+          <ac:chgData name="Emanuel Herberthson" userId="79fb5b5fc78ea11e" providerId="LiveId" clId="{1F159CE9-0C05-485B-AFE6-EFA870FA0FA4}" dt="2024-06-04T17:20:33.803" v="994"/>
+          <ac:spMkLst>
+            <pc:docMk/>
+            <pc:sldMk cId="3173212375" sldId="259"/>
+            <ac:spMk id="12" creationId="{5159CEDA-1F49-DCFB-385F-600872F6284A}"/>
+          </ac:spMkLst>
+        </pc:spChg>
+        <pc:spChg chg="add mod">
+          <ac:chgData name="Emanuel Herberthson" userId="79fb5b5fc78ea11e" providerId="LiveId" clId="{1F159CE9-0C05-485B-AFE6-EFA870FA0FA4}" dt="2024-06-04T17:52:32.723" v="1714" actId="20577"/>
+          <ac:spMkLst>
+            <pc:docMk/>
+            <pc:sldMk cId="3173212375" sldId="259"/>
+            <ac:spMk id="13" creationId="{34E70C0A-4F4B-8102-6359-AACDBB7F56C2}"/>
+          </ac:spMkLst>
+        </pc:spChg>
+        <pc:spChg chg="add del mod">
+          <ac:chgData name="Emanuel Herberthson" userId="79fb5b5fc78ea11e" providerId="LiveId" clId="{1F159CE9-0C05-485B-AFE6-EFA870FA0FA4}" dt="2024-06-04T17:24:08.596" v="1139"/>
+          <ac:spMkLst>
+            <pc:docMk/>
+            <pc:sldMk cId="3173212375" sldId="259"/>
+            <ac:spMk id="14" creationId="{C7D88A36-1EC9-D5A6-10AE-7E7A8F6949D0}"/>
+          </ac:spMkLst>
+        </pc:spChg>
+        <pc:spChg chg="add del mod">
+          <ac:chgData name="Emanuel Herberthson" userId="79fb5b5fc78ea11e" providerId="LiveId" clId="{1F159CE9-0C05-485B-AFE6-EFA870FA0FA4}" dt="2024-06-04T17:24:50.696" v="1156"/>
+          <ac:spMkLst>
+            <pc:docMk/>
+            <pc:sldMk cId="3173212375" sldId="259"/>
+            <ac:spMk id="15" creationId="{569CB351-6AC2-A3FF-185C-151B95B2639D}"/>
+          </ac:spMkLst>
+        </pc:spChg>
+        <pc:spChg chg="add del mod">
+          <ac:chgData name="Emanuel Herberthson" userId="79fb5b5fc78ea11e" providerId="LiveId" clId="{1F159CE9-0C05-485B-AFE6-EFA870FA0FA4}" dt="2024-06-04T17:43:00.735" v="1567"/>
+          <ac:spMkLst>
+            <pc:docMk/>
+            <pc:sldMk cId="3173212375" sldId="259"/>
+            <ac:spMk id="16" creationId="{5814811B-E7A3-E49D-88C3-DB45DDD03D22}"/>
+          </ac:spMkLst>
+        </pc:spChg>
+        <pc:spChg chg="add del mod">
+          <ac:chgData name="Emanuel Herberthson" userId="79fb5b5fc78ea11e" providerId="LiveId" clId="{1F159CE9-0C05-485B-AFE6-EFA870FA0FA4}" dt="2024-06-04T17:42:46.076" v="1543"/>
+          <ac:spMkLst>
+            <pc:docMk/>
+            <pc:sldMk cId="3173212375" sldId="259"/>
+            <ac:spMk id="17" creationId="{01A489C7-E142-31C1-B18F-B35D428CBA96}"/>
+          </ac:spMkLst>
+        </pc:spChg>
+        <pc:spChg chg="add mod">
+          <ac:chgData name="Emanuel Herberthson" userId="79fb5b5fc78ea11e" providerId="LiveId" clId="{1F159CE9-0C05-485B-AFE6-EFA870FA0FA4}" dt="2024-06-04T18:21:13.367" v="2589" actId="1076"/>
+          <ac:spMkLst>
+            <pc:docMk/>
+            <pc:sldMk cId="3173212375" sldId="259"/>
+            <ac:spMk id="17" creationId="{2022FDBB-7DE6-D33A-44CB-E094C2B0DF71}"/>
+          </ac:spMkLst>
+        </pc:spChg>
+        <pc:spChg chg="add mod">
+          <ac:chgData name="Emanuel Herberthson" userId="79fb5b5fc78ea11e" providerId="LiveId" clId="{1F159CE9-0C05-485B-AFE6-EFA870FA0FA4}" dt="2024-06-04T17:31:58.016" v="1356" actId="14100"/>
+          <ac:spMkLst>
+            <pc:docMk/>
+            <pc:sldMk cId="3173212375" sldId="259"/>
+            <ac:spMk id="18" creationId="{F536598D-4EB2-C650-D889-074A13970BEE}"/>
+          </ac:spMkLst>
+        </pc:spChg>
+        <pc:spChg chg="add del mod">
+          <ac:chgData name="Emanuel Herberthson" userId="79fb5b5fc78ea11e" providerId="LiveId" clId="{1F159CE9-0C05-485B-AFE6-EFA870FA0FA4}" dt="2024-06-04T17:35:30.523" v="1411" actId="478"/>
+          <ac:spMkLst>
+            <pc:docMk/>
+            <pc:sldMk cId="3173212375" sldId="259"/>
+            <ac:spMk id="19" creationId="{D68045BD-B58D-6B47-4D84-7443C4401FAE}"/>
+          </ac:spMkLst>
+        </pc:spChg>
+        <pc:spChg chg="add del mod">
+          <ac:chgData name="Emanuel Herberthson" userId="79fb5b5fc78ea11e" providerId="LiveId" clId="{1F159CE9-0C05-485B-AFE6-EFA870FA0FA4}" dt="2024-06-04T17:35:49.968" v="1426"/>
+          <ac:spMkLst>
+            <pc:docMk/>
+            <pc:sldMk cId="3173212375" sldId="259"/>
+            <ac:spMk id="22" creationId="{5029C0EA-09BE-C126-FB20-693C9F487CC6}"/>
+          </ac:spMkLst>
+        </pc:spChg>
+        <pc:spChg chg="add del mod">
+          <ac:chgData name="Emanuel Herberthson" userId="79fb5b5fc78ea11e" providerId="LiveId" clId="{1F159CE9-0C05-485B-AFE6-EFA870FA0FA4}" dt="2024-06-04T17:42:41.107" v="1540" actId="478"/>
+          <ac:spMkLst>
+            <pc:docMk/>
+            <pc:sldMk cId="3173212375" sldId="259"/>
+            <ac:spMk id="24" creationId="{2165D55E-A22F-28FE-28BC-5F772C31505B}"/>
+          </ac:spMkLst>
+        </pc:spChg>
+        <pc:spChg chg="add mod">
+          <ac:chgData name="Emanuel Herberthson" userId="79fb5b5fc78ea11e" providerId="LiveId" clId="{1F159CE9-0C05-485B-AFE6-EFA870FA0FA4}" dt="2024-06-04T18:31:20.141" v="2992" actId="20577"/>
+          <ac:spMkLst>
+            <pc:docMk/>
+            <pc:sldMk cId="3173212375" sldId="259"/>
+            <ac:spMk id="24" creationId="{F32F7D48-C9B5-2084-9F33-10DE8237AD20}"/>
+          </ac:spMkLst>
+        </pc:spChg>
+        <pc:spChg chg="mod">
+          <ac:chgData name="Emanuel Herberthson" userId="79fb5b5fc78ea11e" providerId="LiveId" clId="{1F159CE9-0C05-485B-AFE6-EFA870FA0FA4}" dt="2024-06-04T16:57:45.075" v="432" actId="1076"/>
+          <ac:spMkLst>
+            <pc:docMk/>
+            <pc:sldMk cId="3173212375" sldId="259"/>
+            <ac:spMk id="30" creationId="{BD540356-4E6F-C942-B0D3-E8EF1A743056}"/>
+          </ac:spMkLst>
+        </pc:spChg>
+        <pc:spChg chg="mod">
+          <ac:chgData name="Emanuel Herberthson" userId="79fb5b5fc78ea11e" providerId="LiveId" clId="{1F159CE9-0C05-485B-AFE6-EFA870FA0FA4}" dt="2024-06-04T17:21:48.159" v="1036" actId="20577"/>
+          <ac:spMkLst>
+            <pc:docMk/>
+            <pc:sldMk cId="3173212375" sldId="259"/>
+            <ac:spMk id="35" creationId="{79751C98-07D4-9E4F-B8EA-2EC69A53E599}"/>
+          </ac:spMkLst>
+        </pc:spChg>
+        <pc:spChg chg="mod">
+          <ac:chgData name="Emanuel Herberthson" userId="79fb5b5fc78ea11e" providerId="LiveId" clId="{1F159CE9-0C05-485B-AFE6-EFA870FA0FA4}" dt="2024-06-04T16:57:31.196" v="394" actId="20577"/>
+          <ac:spMkLst>
+            <pc:docMk/>
+            <pc:sldMk cId="3173212375" sldId="259"/>
+            <ac:spMk id="38" creationId="{A62F6516-278F-9C49-A513-1A5BCF3A0D49}"/>
+          </ac:spMkLst>
+        </pc:spChg>
+        <pc:spChg chg="del mod">
+          <ac:chgData name="Emanuel Herberthson" userId="79fb5b5fc78ea11e" providerId="LiveId" clId="{1F159CE9-0C05-485B-AFE6-EFA870FA0FA4}" dt="2024-06-04T16:57:45.443" v="434"/>
+          <ac:spMkLst>
+            <pc:docMk/>
+            <pc:sldMk cId="3173212375" sldId="259"/>
+            <ac:spMk id="39" creationId="{49741301-AFA9-8F45-BB67-4B379BDD3140}"/>
+          </ac:spMkLst>
+        </pc:spChg>
+        <pc:spChg chg="add mod">
+          <ac:chgData name="Emanuel Herberthson" userId="79fb5b5fc78ea11e" providerId="LiveId" clId="{1F159CE9-0C05-485B-AFE6-EFA870FA0FA4}" dt="2024-06-04T18:00:38.817" v="2017" actId="20577"/>
+          <ac:spMkLst>
+            <pc:docMk/>
+            <pc:sldMk cId="3173212375" sldId="259"/>
+            <ac:spMk id="40" creationId="{5D12DB6D-37ED-75B0-B7DA-1379FB71037F}"/>
+          </ac:spMkLst>
+        </pc:spChg>
+        <pc:spChg chg="add mod">
+          <ac:chgData name="Emanuel Herberthson" userId="79fb5b5fc78ea11e" providerId="LiveId" clId="{1F159CE9-0C05-485B-AFE6-EFA870FA0FA4}" dt="2024-06-04T18:14:38.276" v="2410" actId="14100"/>
+          <ac:spMkLst>
+            <pc:docMk/>
+            <pc:sldMk cId="3173212375" sldId="259"/>
+            <ac:spMk id="42" creationId="{4F2F7A2A-322B-D735-5EF6-389E8BC023E1}"/>
+          </ac:spMkLst>
+        </pc:spChg>
+        <pc:spChg chg="mod">
+          <ac:chgData name="Emanuel Herberthson" userId="79fb5b5fc78ea11e" providerId="LiveId" clId="{1F159CE9-0C05-485B-AFE6-EFA870FA0FA4}" dt="2024-06-04T17:21:06.529" v="1035" actId="20577"/>
+          <ac:spMkLst>
+            <pc:docMk/>
+            <pc:sldMk cId="3173212375" sldId="259"/>
+            <ac:spMk id="46" creationId="{A0F06E5F-AB38-5745-AC95-E7B4DBF17261}"/>
+          </ac:spMkLst>
+        </pc:spChg>
+        <pc:spChg chg="add del mod topLvl">
+          <ac:chgData name="Emanuel Herberthson" userId="79fb5b5fc78ea11e" providerId="LiveId" clId="{1F159CE9-0C05-485B-AFE6-EFA870FA0FA4}" dt="2024-06-04T18:23:56.087" v="2628" actId="20577"/>
+          <ac:spMkLst>
+            <pc:docMk/>
+            <pc:sldMk cId="3173212375" sldId="259"/>
+            <ac:spMk id="49" creationId="{1660BD0F-9FEE-5E4D-B5A5-37BA29ED64F6}"/>
+          </ac:spMkLst>
+        </pc:spChg>
+        <pc:spChg chg="mod topLvl">
+          <ac:chgData name="Emanuel Herberthson" userId="79fb5b5fc78ea11e" providerId="LiveId" clId="{1F159CE9-0C05-485B-AFE6-EFA870FA0FA4}" dt="2024-06-04T18:04:29.586" v="2359" actId="478"/>
+          <ac:spMkLst>
+            <pc:docMk/>
+            <pc:sldMk cId="3173212375" sldId="259"/>
+            <ac:spMk id="50" creationId="{EFF684F2-5F40-134D-A78D-AF6B2D54AC0E}"/>
+          </ac:spMkLst>
+        </pc:spChg>
+        <pc:spChg chg="mod">
+          <ac:chgData name="Emanuel Herberthson" userId="79fb5b5fc78ea11e" providerId="LiveId" clId="{1F159CE9-0C05-485B-AFE6-EFA870FA0FA4}" dt="2024-06-04T18:24:10.631" v="2674" actId="20577"/>
+          <ac:spMkLst>
+            <pc:docMk/>
+            <pc:sldMk cId="3173212375" sldId="259"/>
+            <ac:spMk id="52" creationId="{36485A7E-1BBD-204E-80F2-0E6DCE7AC023}"/>
+          </ac:spMkLst>
+        </pc:spChg>
+        <pc:grpChg chg="add mod">
+          <ac:chgData name="Emanuel Herberthson" userId="79fb5b5fc78ea11e" providerId="LiveId" clId="{1F159CE9-0C05-485B-AFE6-EFA870FA0FA4}" dt="2024-06-04T17:53:52.504" v="1844" actId="1076"/>
+          <ac:grpSpMkLst>
+            <pc:docMk/>
+            <pc:sldMk cId="3173212375" sldId="259"/>
+            <ac:grpSpMk id="8" creationId="{C4749C31-9C90-AAF8-4B2B-D967D35CEE4B}"/>
+          </ac:grpSpMkLst>
+        </pc:grpChg>
+        <pc:grpChg chg="mod">
+          <ac:chgData name="Emanuel Herberthson" userId="79fb5b5fc78ea11e" providerId="LiveId" clId="{1F159CE9-0C05-485B-AFE6-EFA870FA0FA4}" dt="2024-06-04T17:20:37.197" v="995" actId="1076"/>
+          <ac:grpSpMkLst>
+            <pc:docMk/>
+            <pc:sldMk cId="3173212375" sldId="259"/>
+            <ac:grpSpMk id="45" creationId="{6CF3C226-2563-DE44-8B21-583716B31E52}"/>
+          </ac:grpSpMkLst>
+        </pc:grpChg>
+        <pc:grpChg chg="add del mod">
+          <ac:chgData name="Emanuel Herberthson" userId="79fb5b5fc78ea11e" providerId="LiveId" clId="{1F159CE9-0C05-485B-AFE6-EFA870FA0FA4}" dt="2024-06-04T18:21:09.071" v="2588" actId="1076"/>
+          <ac:grpSpMkLst>
+            <pc:docMk/>
+            <pc:sldMk cId="3173212375" sldId="259"/>
+            <ac:grpSpMk id="48" creationId="{DEE10B5D-BFB4-8446-94E8-C2FA40BE02B9}"/>
+          </ac:grpSpMkLst>
+        </pc:grpChg>
+        <pc:grpChg chg="mod">
+          <ac:chgData name="Emanuel Herberthson" userId="79fb5b5fc78ea11e" providerId="LiveId" clId="{1F159CE9-0C05-485B-AFE6-EFA870FA0FA4}" dt="2024-06-04T18:31:10.723" v="2990" actId="1076"/>
+          <ac:grpSpMkLst>
+            <pc:docMk/>
+            <pc:sldMk cId="3173212375" sldId="259"/>
+            <ac:grpSpMk id="51" creationId="{F8A61C06-B507-E04B-9DE5-7CE3AE2D3B6D}"/>
+          </ac:grpSpMkLst>
+        </pc:grpChg>
+        <pc:graphicFrameChg chg="add del mod modGraphic">
+          <ac:chgData name="Emanuel Herberthson" userId="79fb5b5fc78ea11e" providerId="LiveId" clId="{1F159CE9-0C05-485B-AFE6-EFA870FA0FA4}" dt="2024-06-04T18:25:09.697" v="2692" actId="478"/>
+          <ac:graphicFrameMkLst>
+            <pc:docMk/>
+            <pc:sldMk cId="3173212375" sldId="259"/>
+            <ac:graphicFrameMk id="19" creationId="{07D8D588-31E5-777A-5273-41539309F15F}"/>
+          </ac:graphicFrameMkLst>
+        </pc:graphicFrameChg>
+        <pc:graphicFrameChg chg="add mod modGraphic">
+          <ac:chgData name="Emanuel Herberthson" userId="79fb5b5fc78ea11e" providerId="LiveId" clId="{1F159CE9-0C05-485B-AFE6-EFA870FA0FA4}" dt="2024-06-04T18:29:42.638" v="2848" actId="1076"/>
+          <ac:graphicFrameMkLst>
+            <pc:docMk/>
+            <pc:sldMk cId="3173212375" sldId="259"/>
+            <ac:graphicFrameMk id="22" creationId="{F8C74995-2FB0-59FD-D8C9-01C82822BE91}"/>
+          </ac:graphicFrameMkLst>
+        </pc:graphicFrameChg>
+        <pc:picChg chg="add mod">
+          <ac:chgData name="Emanuel Herberthson" userId="79fb5b5fc78ea11e" providerId="LiveId" clId="{1F159CE9-0C05-485B-AFE6-EFA870FA0FA4}" dt="2024-06-04T18:12:30.899" v="2406" actId="1076"/>
+          <ac:picMkLst>
+            <pc:docMk/>
+            <pc:sldMk cId="3173212375" sldId="259"/>
+            <ac:picMk id="14" creationId="{E5A82373-E402-7A91-90D0-A47C128EEEA8}"/>
+          </ac:picMkLst>
+        </pc:picChg>
+        <pc:picChg chg="add mod">
+          <ac:chgData name="Emanuel Herberthson" userId="79fb5b5fc78ea11e" providerId="LiveId" clId="{1F159CE9-0C05-485B-AFE6-EFA870FA0FA4}" dt="2024-06-04T18:12:34.639" v="2407" actId="1076"/>
+          <ac:picMkLst>
+            <pc:docMk/>
+            <pc:sldMk cId="3173212375" sldId="259"/>
+            <ac:picMk id="16" creationId="{BAAE7B4E-776F-8A89-B097-B9B58340B146}"/>
+          </ac:picMkLst>
+        </pc:picChg>
+        <pc:picChg chg="add del mod">
+          <ac:chgData name="Emanuel Herberthson" userId="79fb5b5fc78ea11e" providerId="LiveId" clId="{1F159CE9-0C05-485B-AFE6-EFA870FA0FA4}" dt="2024-06-04T17:46:05.221" v="1583" actId="478"/>
+          <ac:picMkLst>
+            <pc:docMk/>
+            <pc:sldMk cId="3173212375" sldId="259"/>
+            <ac:picMk id="26" creationId="{4B828403-850C-843A-3772-DCF15E2338D3}"/>
+          </ac:picMkLst>
+        </pc:picChg>
+        <pc:picChg chg="add mod">
+          <ac:chgData name="Emanuel Herberthson" userId="79fb5b5fc78ea11e" providerId="LiveId" clId="{1F159CE9-0C05-485B-AFE6-EFA870FA0FA4}" dt="2024-06-04T17:50:29.037" v="1618" actId="1076"/>
+          <ac:picMkLst>
+            <pc:docMk/>
+            <pc:sldMk cId="3173212375" sldId="259"/>
+            <ac:picMk id="28" creationId="{1EF0737E-382C-A656-FC0E-1565A7DA4952}"/>
+          </ac:picMkLst>
+        </pc:picChg>
+        <pc:picChg chg="add mod">
+          <ac:chgData name="Emanuel Herberthson" userId="79fb5b5fc78ea11e" providerId="LiveId" clId="{1F159CE9-0C05-485B-AFE6-EFA870FA0FA4}" dt="2024-06-04T17:49:36.082" v="1612" actId="14100"/>
+          <ac:picMkLst>
+            <pc:docMk/>
+            <pc:sldMk cId="3173212375" sldId="259"/>
+            <ac:picMk id="32" creationId="{F6BAF546-EC5B-CC45-57C5-5450558A67ED}"/>
+          </ac:picMkLst>
+        </pc:picChg>
+        <pc:picChg chg="add mod">
+          <ac:chgData name="Emanuel Herberthson" userId="79fb5b5fc78ea11e" providerId="LiveId" clId="{1F159CE9-0C05-485B-AFE6-EFA870FA0FA4}" dt="2024-06-04T17:49:19.555" v="1608" actId="1076"/>
+          <ac:picMkLst>
+            <pc:docMk/>
+            <pc:sldMk cId="3173212375" sldId="259"/>
+            <ac:picMk id="34" creationId="{FACEE865-995E-D492-0158-C8D0C435BD14}"/>
+          </ac:picMkLst>
+        </pc:picChg>
+        <pc:picChg chg="add mod">
+          <ac:chgData name="Emanuel Herberthson" userId="79fb5b5fc78ea11e" providerId="LiveId" clId="{1F159CE9-0C05-485B-AFE6-EFA870FA0FA4}" dt="2024-06-04T17:49:11.423" v="1607" actId="1076"/>
+          <ac:picMkLst>
+            <pc:docMk/>
+            <pc:sldMk cId="3173212375" sldId="259"/>
+            <ac:picMk id="37" creationId="{EAD581E8-21AE-5254-7388-16DAB12788F9}"/>
+          </ac:picMkLst>
+        </pc:picChg>
       </pc:sldChg>
     </pc:docChg>
   </pc:docChgLst>
@@ -3635,8 +3978,8 @@
         </p:nvSpPr>
         <p:spPr>
           <a:xfrm>
-            <a:off x="7685170" y="597483"/>
-            <a:ext cx="21270830" cy="1015663"/>
+            <a:off x="7207503" y="401879"/>
+            <a:ext cx="22906891" cy="1015663"/>
           </a:xfrm>
           <a:prstGeom prst="rect">
             <a:avLst/>
@@ -3651,20 +3994,32 @@
           <a:p>
             <a:pPr algn="ctr"/>
             <a:r>
-              <a:rPr lang="en-US" sz="6000">
+              <a:rPr lang="en-US" sz="6000" dirty="0">
                 <a:solidFill>
                   <a:schemeClr val="bg1"/>
                 </a:solidFill>
                 <a:latin typeface="Source Sans Pro Regular"/>
               </a:rPr>
-              <a:t>EE364B</a:t>
-            </a:r>
-            <a:endParaRPr lang="en-US" sz="6000" dirty="0">
-              <a:solidFill>
-                <a:schemeClr val="bg1"/>
-              </a:solidFill>
-              <a:latin typeface="Source Sans Pro Regular"/>
-            </a:endParaRPr>
+              <a:t>So you think ADMM is fast, huh? Try the GPU-</a:t>
+            </a:r>
+            <a:r>
+              <a:rPr lang="en-US" sz="6000" dirty="0" err="1">
+                <a:solidFill>
+                  <a:schemeClr val="bg1"/>
+                </a:solidFill>
+                <a:latin typeface="Source Sans Pro Regular"/>
+              </a:rPr>
+              <a:t>ified</a:t>
+            </a:r>
+            <a:r>
+              <a:rPr lang="en-US" sz="6000" dirty="0">
+                <a:solidFill>
+                  <a:schemeClr val="bg1"/>
+                </a:solidFill>
+                <a:latin typeface="Source Sans Pro Regular"/>
+              </a:rPr>
+              <a:t> interior-point method</a:t>
+            </a:r>
           </a:p>
         </p:txBody>
       </p:sp>
@@ -3774,8 +4129,41 @@
                 </a:solidFill>
                 <a:latin typeface="Source Sans Pro Italic"/>
               </a:rPr>
-              <a:t>Frank DeGuire III, Emanuel Herberthson</a:t>
-            </a:r>
+              <a:t>Frank DeGuire III</a:t>
+            </a:r>
+            <a:r>
+              <a:rPr lang="en-US" sz="4000" i="1" baseline="30000" dirty="0">
+                <a:solidFill>
+                  <a:schemeClr val="bg1"/>
+                </a:solidFill>
+                <a:latin typeface="Source Sans Pro Italic"/>
+              </a:rPr>
+              <a:t>1</a:t>
+            </a:r>
+            <a:r>
+              <a:rPr lang="en-US" sz="4000" i="1" dirty="0">
+                <a:solidFill>
+                  <a:schemeClr val="bg1"/>
+                </a:solidFill>
+                <a:latin typeface="Source Sans Pro Italic"/>
+              </a:rPr>
+              <a:t>, Emanuel Herberthson</a:t>
+            </a:r>
+            <a:r>
+              <a:rPr lang="en-US" sz="4000" i="1" baseline="30000" dirty="0">
+                <a:solidFill>
+                  <a:schemeClr val="bg1"/>
+                </a:solidFill>
+                <a:latin typeface="Source Sans Pro Italic"/>
+              </a:rPr>
+              <a:t>1</a:t>
+            </a:r>
+            <a:endParaRPr lang="en-US" sz="4000" i="1" dirty="0">
+              <a:solidFill>
+                <a:schemeClr val="bg1"/>
+              </a:solidFill>
+              <a:latin typeface="Source Sans Pro Italic"/>
+            </a:endParaRPr>
           </a:p>
         </p:txBody>
       </p:sp>
@@ -3808,6 +4196,15 @@
           <a:lstStyle/>
           <a:p>
             <a:pPr algn="ctr"/>
+            <a:r>
+              <a:rPr lang="en-US" sz="2800" i="1" baseline="30000" dirty="0">
+                <a:solidFill>
+                  <a:schemeClr val="bg1"/>
+                </a:solidFill>
+                <a:latin typeface="Source Sans Pro Italic"/>
+              </a:rPr>
+              <a:t>1</a:t>
+            </a:r>
             <a:r>
               <a:rPr lang="en-US" sz="2800" i="1" dirty="0">
                 <a:solidFill>
@@ -4300,1050 +4697,6 @@
           </p:txBody>
         </p:sp>
       </p:grpSp>
-      <p:sp>
-        <p:nvSpPr>
-          <p:cNvPr id="75" name="TextBox 74">
-            <a:extLst>
-              <a:ext uri="{FF2B5EF4-FFF2-40B4-BE49-F238E27FC236}">
-                <a16:creationId xmlns:a16="http://schemas.microsoft.com/office/drawing/2014/main" id="{54EEA09E-11F0-A54C-9909-790F4A6B807C}"/>
-              </a:ext>
-            </a:extLst>
-          </p:cNvPr>
-          <p:cNvSpPr txBox="1"/>
-          <p:nvPr/>
-        </p:nvSpPr>
-        <p:spPr>
-          <a:xfrm>
-            <a:off x="527715" y="5082822"/>
-            <a:ext cx="4167054" cy="14496276"/>
-          </a:xfrm>
-          <a:prstGeom prst="rect">
-            <a:avLst/>
-          </a:prstGeom>
-          <a:noFill/>
-        </p:spPr>
-        <p:txBody>
-          <a:bodyPr wrap="square" rtlCol="0">
-            <a:spAutoFit/>
-          </a:bodyPr>
-          <a:lstStyle/>
-          <a:p>
-            <a:r>
-              <a:rPr lang="en-US" sz="2400" dirty="0"/>
-              <a:t>Lorem ipsum dolor sit </a:t>
-            </a:r>
-            <a:r>
-              <a:rPr lang="en-US" sz="2400" dirty="0" err="1"/>
-              <a:t>amet</a:t>
-            </a:r>
-            <a:r>
-              <a:rPr lang="en-US" sz="2400" dirty="0"/>
-              <a:t>, </a:t>
-            </a:r>
-            <a:r>
-              <a:rPr lang="en-US" sz="2400" dirty="0" err="1"/>
-              <a:t>consectetur</a:t>
-            </a:r>
-            <a:r>
-              <a:rPr lang="en-US" sz="2400" dirty="0"/>
-              <a:t> </a:t>
-            </a:r>
-            <a:r>
-              <a:rPr lang="en-US" sz="2400" dirty="0" err="1"/>
-              <a:t>adipiscing</a:t>
-            </a:r>
-            <a:r>
-              <a:rPr lang="en-US" sz="2400" dirty="0"/>
-              <a:t> </a:t>
-            </a:r>
-            <a:r>
-              <a:rPr lang="en-US" sz="2400" dirty="0" err="1"/>
-              <a:t>elit</a:t>
-            </a:r>
-            <a:r>
-              <a:rPr lang="en-US" sz="2400" dirty="0"/>
-              <a:t>. </a:t>
-            </a:r>
-            <a:r>
-              <a:rPr lang="en-US" sz="2400" dirty="0" err="1"/>
-              <a:t>Etiam</a:t>
-            </a:r>
-            <a:r>
-              <a:rPr lang="en-US" sz="2400" dirty="0"/>
-              <a:t> </a:t>
-            </a:r>
-            <a:r>
-              <a:rPr lang="en-US" sz="2400" dirty="0" err="1"/>
-              <a:t>eget</a:t>
-            </a:r>
-            <a:r>
-              <a:rPr lang="en-US" sz="2400" dirty="0"/>
-              <a:t> </a:t>
-            </a:r>
-            <a:r>
-              <a:rPr lang="en-US" sz="2400" dirty="0" err="1"/>
-              <a:t>enim</a:t>
-            </a:r>
-            <a:r>
-              <a:rPr lang="en-US" sz="2400" dirty="0"/>
-              <a:t> </a:t>
-            </a:r>
-            <a:r>
-              <a:rPr lang="en-US" sz="2400" dirty="0" err="1"/>
-              <a:t>nec</a:t>
-            </a:r>
-            <a:r>
-              <a:rPr lang="en-US" sz="2400" dirty="0"/>
-              <a:t> ex </a:t>
-            </a:r>
-            <a:r>
-              <a:rPr lang="en-US" sz="2400" dirty="0" err="1"/>
-              <a:t>laoreet</a:t>
-            </a:r>
-            <a:r>
-              <a:rPr lang="en-US" sz="2400" dirty="0"/>
-              <a:t> </a:t>
-            </a:r>
-            <a:r>
-              <a:rPr lang="en-US" sz="2400" dirty="0" err="1"/>
-              <a:t>tempor</a:t>
-            </a:r>
-            <a:r>
-              <a:rPr lang="en-US" sz="2400" dirty="0"/>
-              <a:t> a </a:t>
-            </a:r>
-            <a:r>
-              <a:rPr lang="en-US" sz="2400" dirty="0" err="1"/>
-              <a:t>vel</a:t>
-            </a:r>
-            <a:r>
-              <a:rPr lang="en-US" sz="2400" dirty="0"/>
-              <a:t> </a:t>
-            </a:r>
-            <a:r>
-              <a:rPr lang="en-US" sz="2400" dirty="0" err="1"/>
-              <a:t>augue</a:t>
-            </a:r>
-            <a:r>
-              <a:rPr lang="en-US" sz="2400" dirty="0"/>
-              <a:t>. </a:t>
-            </a:r>
-            <a:r>
-              <a:rPr lang="en-US" sz="2400" dirty="0" err="1"/>
-              <a:t>Nullam</a:t>
-            </a:r>
-            <a:r>
-              <a:rPr lang="en-US" sz="2400" dirty="0"/>
-              <a:t> </a:t>
-            </a:r>
-            <a:r>
-              <a:rPr lang="en-US" sz="2400" dirty="0" err="1"/>
-              <a:t>consectetur</a:t>
-            </a:r>
-            <a:r>
-              <a:rPr lang="en-US" sz="2400" dirty="0"/>
-              <a:t> </a:t>
-            </a:r>
-            <a:r>
-              <a:rPr lang="en-US" sz="2400" dirty="0" err="1"/>
-              <a:t>nibh</a:t>
-            </a:r>
-            <a:r>
-              <a:rPr lang="en-US" sz="2400" dirty="0"/>
-              <a:t> </a:t>
-            </a:r>
-            <a:r>
-              <a:rPr lang="en-US" sz="2400" dirty="0" err="1"/>
-              <a:t>placerat</a:t>
-            </a:r>
-            <a:r>
-              <a:rPr lang="en-US" sz="2400" dirty="0"/>
-              <a:t>, </a:t>
-            </a:r>
-            <a:r>
-              <a:rPr lang="en-US" sz="2400" dirty="0" err="1"/>
-              <a:t>finibus</a:t>
-            </a:r>
-            <a:r>
-              <a:rPr lang="en-US" sz="2400" dirty="0"/>
-              <a:t> </a:t>
-            </a:r>
-            <a:r>
-              <a:rPr lang="en-US" sz="2400" dirty="0" err="1"/>
-              <a:t>felis</a:t>
-            </a:r>
-            <a:r>
-              <a:rPr lang="en-US" sz="2400" dirty="0"/>
-              <a:t> </a:t>
-            </a:r>
-            <a:r>
-              <a:rPr lang="en-US" sz="2400" dirty="0" err="1"/>
-              <a:t>placerat</a:t>
-            </a:r>
-            <a:r>
-              <a:rPr lang="en-US" sz="2400" dirty="0"/>
-              <a:t>, </a:t>
-            </a:r>
-            <a:r>
-              <a:rPr lang="en-US" sz="2400" dirty="0" err="1"/>
-              <a:t>blandit</a:t>
-            </a:r>
-            <a:r>
-              <a:rPr lang="en-US" sz="2400" dirty="0"/>
-              <a:t> </a:t>
-            </a:r>
-            <a:r>
-              <a:rPr lang="en-US" sz="2400" dirty="0" err="1"/>
-              <a:t>enim</a:t>
-            </a:r>
-            <a:r>
-              <a:rPr lang="en-US" sz="2400" dirty="0"/>
-              <a:t>. </a:t>
-            </a:r>
-            <a:r>
-              <a:rPr lang="en-US" sz="2400" dirty="0" err="1"/>
-              <a:t>Curabitur</a:t>
-            </a:r>
-            <a:r>
-              <a:rPr lang="en-US" sz="2400" dirty="0"/>
-              <a:t> </a:t>
-            </a:r>
-            <a:r>
-              <a:rPr lang="en-US" sz="2400" dirty="0" err="1"/>
-              <a:t>sed</a:t>
-            </a:r>
-            <a:r>
-              <a:rPr lang="en-US" sz="2400" dirty="0"/>
-              <a:t> </a:t>
-            </a:r>
-            <a:r>
-              <a:rPr lang="en-US" sz="2400" dirty="0" err="1"/>
-              <a:t>enim</a:t>
-            </a:r>
-            <a:r>
-              <a:rPr lang="en-US" sz="2400" dirty="0"/>
-              <a:t> </a:t>
-            </a:r>
-            <a:r>
-              <a:rPr lang="en-US" sz="2400" dirty="0" err="1"/>
-              <a:t>tellus</a:t>
-            </a:r>
-            <a:r>
-              <a:rPr lang="en-US" sz="2400" dirty="0"/>
-              <a:t>. </a:t>
-            </a:r>
-            <a:r>
-              <a:rPr lang="en-US" sz="2400" dirty="0" err="1"/>
-              <a:t>Sed</a:t>
-            </a:r>
-            <a:r>
-              <a:rPr lang="en-US" sz="2400" dirty="0"/>
-              <a:t> </a:t>
-            </a:r>
-            <a:r>
-              <a:rPr lang="en-US" sz="2400" dirty="0" err="1"/>
-              <a:t>posuere</a:t>
-            </a:r>
-            <a:r>
-              <a:rPr lang="en-US" sz="2400" dirty="0"/>
-              <a:t> </a:t>
-            </a:r>
-            <a:r>
-              <a:rPr lang="en-US" sz="2400" dirty="0" err="1"/>
-              <a:t>elementum</a:t>
-            </a:r>
-            <a:r>
-              <a:rPr lang="en-US" sz="2400" dirty="0"/>
-              <a:t> pulvinar. </a:t>
-            </a:r>
-            <a:r>
-              <a:rPr lang="en-US" sz="2400" dirty="0" err="1"/>
-              <a:t>Fusce</a:t>
-            </a:r>
-            <a:r>
-              <a:rPr lang="en-US" sz="2400" dirty="0"/>
-              <a:t> </a:t>
-            </a:r>
-            <a:r>
-              <a:rPr lang="en-US" sz="2400" dirty="0" err="1"/>
-              <a:t>sed</a:t>
-            </a:r>
-            <a:r>
-              <a:rPr lang="en-US" sz="2400" dirty="0"/>
-              <a:t> </a:t>
-            </a:r>
-            <a:r>
-              <a:rPr lang="en-US" sz="2400" dirty="0" err="1"/>
-              <a:t>aliquet</a:t>
-            </a:r>
-            <a:r>
-              <a:rPr lang="en-US" sz="2400" dirty="0"/>
-              <a:t> ante, id </a:t>
-            </a:r>
-            <a:r>
-              <a:rPr lang="en-US" sz="2400" dirty="0" err="1"/>
-              <a:t>imperdiet</a:t>
-            </a:r>
-            <a:r>
-              <a:rPr lang="en-US" sz="2400" dirty="0"/>
-              <a:t> magna. </a:t>
-            </a:r>
-            <a:r>
-              <a:rPr lang="en-US" sz="2400" dirty="0" err="1"/>
-              <a:t>Nulla</a:t>
-            </a:r>
-            <a:r>
-              <a:rPr lang="en-US" sz="2400" dirty="0"/>
-              <a:t> </a:t>
-            </a:r>
-            <a:r>
-              <a:rPr lang="en-US" sz="2400" dirty="0" err="1"/>
-              <a:t>facilisi</a:t>
-            </a:r>
-            <a:r>
-              <a:rPr lang="en-US" sz="2400" dirty="0"/>
-              <a:t>. Ut </a:t>
-            </a:r>
-            <a:r>
-              <a:rPr lang="en-US" sz="2400" dirty="0" err="1"/>
-              <a:t>viverra</a:t>
-            </a:r>
-            <a:r>
-              <a:rPr lang="en-US" sz="2400" dirty="0"/>
-              <a:t> </a:t>
-            </a:r>
-            <a:r>
-              <a:rPr lang="en-US" sz="2400" dirty="0" err="1"/>
-              <a:t>scelerisque</a:t>
-            </a:r>
-            <a:r>
-              <a:rPr lang="en-US" sz="2400" dirty="0"/>
-              <a:t> </a:t>
-            </a:r>
-            <a:r>
-              <a:rPr lang="en-US" sz="2400" dirty="0" err="1"/>
-              <a:t>nulla</a:t>
-            </a:r>
-            <a:r>
-              <a:rPr lang="en-US" sz="2400" dirty="0"/>
-              <a:t> vitae </a:t>
-            </a:r>
-            <a:r>
-              <a:rPr lang="en-US" sz="2400" dirty="0" err="1"/>
-              <a:t>faucibus</a:t>
-            </a:r>
-            <a:r>
-              <a:rPr lang="en-US" sz="2400" dirty="0"/>
-              <a:t>. Lorem ipsum dolor sit </a:t>
-            </a:r>
-            <a:r>
-              <a:rPr lang="en-US" sz="2400" dirty="0" err="1"/>
-              <a:t>amet</a:t>
-            </a:r>
-            <a:r>
-              <a:rPr lang="en-US" sz="2400" dirty="0"/>
-              <a:t>, </a:t>
-            </a:r>
-            <a:r>
-              <a:rPr lang="en-US" sz="2400" dirty="0" err="1"/>
-              <a:t>consectetur</a:t>
-            </a:r>
-            <a:r>
-              <a:rPr lang="en-US" sz="2400" dirty="0"/>
-              <a:t> </a:t>
-            </a:r>
-            <a:r>
-              <a:rPr lang="en-US" sz="2400" dirty="0" err="1"/>
-              <a:t>adipiscing</a:t>
-            </a:r>
-            <a:r>
-              <a:rPr lang="en-US" sz="2400" dirty="0"/>
-              <a:t> </a:t>
-            </a:r>
-            <a:r>
-              <a:rPr lang="en-US" sz="2400" dirty="0" err="1"/>
-              <a:t>elit</a:t>
-            </a:r>
-            <a:r>
-              <a:rPr lang="en-US" sz="2400" dirty="0"/>
-              <a:t>. </a:t>
-            </a:r>
-            <a:r>
-              <a:rPr lang="en-US" sz="2400" dirty="0" err="1"/>
-              <a:t>Praesent</a:t>
-            </a:r>
-            <a:r>
-              <a:rPr lang="en-US" sz="2400" dirty="0"/>
-              <a:t> </a:t>
-            </a:r>
-            <a:r>
-              <a:rPr lang="en-US" sz="2400" dirty="0" err="1"/>
-              <a:t>eget</a:t>
-            </a:r>
-            <a:r>
-              <a:rPr lang="en-US" sz="2400" dirty="0"/>
-              <a:t> </a:t>
-            </a:r>
-            <a:r>
-              <a:rPr lang="en-US" sz="2400" dirty="0" err="1"/>
-              <a:t>lobortis</a:t>
-            </a:r>
-            <a:r>
-              <a:rPr lang="en-US" sz="2400" dirty="0"/>
-              <a:t> </a:t>
-            </a:r>
-            <a:r>
-              <a:rPr lang="en-US" sz="2400" dirty="0" err="1"/>
-              <a:t>orci</a:t>
-            </a:r>
-            <a:r>
-              <a:rPr lang="en-US" sz="2400" dirty="0"/>
-              <a:t>. Nunc </a:t>
-            </a:r>
-            <a:r>
-              <a:rPr lang="en-US" sz="2400" dirty="0" err="1"/>
-              <a:t>nec</a:t>
-            </a:r>
-            <a:r>
-              <a:rPr lang="en-US" sz="2400" dirty="0"/>
-              <a:t> </a:t>
-            </a:r>
-            <a:r>
-              <a:rPr lang="en-US" sz="2400" dirty="0" err="1"/>
-              <a:t>lacus</a:t>
-            </a:r>
-            <a:r>
-              <a:rPr lang="en-US" sz="2400" dirty="0"/>
-              <a:t> non </a:t>
-            </a:r>
-            <a:r>
-              <a:rPr lang="en-US" sz="2400" dirty="0" err="1"/>
-              <a:t>nulla</a:t>
-            </a:r>
-            <a:r>
-              <a:rPr lang="en-US" sz="2400" dirty="0"/>
-              <a:t> </a:t>
-            </a:r>
-            <a:r>
-              <a:rPr lang="en-US" sz="2400" dirty="0" err="1"/>
-              <a:t>vulputate</a:t>
-            </a:r>
-            <a:r>
-              <a:rPr lang="en-US" sz="2400" dirty="0"/>
-              <a:t> </a:t>
-            </a:r>
-            <a:r>
-              <a:rPr lang="en-US" sz="2400" dirty="0" err="1"/>
-              <a:t>finibus</a:t>
-            </a:r>
-            <a:r>
-              <a:rPr lang="en-US" sz="2400" dirty="0"/>
-              <a:t> et a </a:t>
-            </a:r>
-            <a:r>
-              <a:rPr lang="en-US" sz="2400" dirty="0" err="1"/>
-              <a:t>purus</a:t>
-            </a:r>
-            <a:r>
-              <a:rPr lang="en-US" sz="2400" dirty="0"/>
-              <a:t>. </a:t>
-            </a:r>
-            <a:r>
-              <a:rPr lang="en-US" sz="2400" dirty="0" err="1"/>
-              <a:t>Pellentesque</a:t>
-            </a:r>
-            <a:r>
-              <a:rPr lang="en-US" sz="2400" dirty="0"/>
-              <a:t> </a:t>
-            </a:r>
-            <a:r>
-              <a:rPr lang="en-US" sz="2400" dirty="0" err="1"/>
-              <a:t>ut</a:t>
-            </a:r>
-            <a:r>
-              <a:rPr lang="en-US" sz="2400" dirty="0"/>
-              <a:t> </a:t>
-            </a:r>
-            <a:r>
-              <a:rPr lang="en-US" sz="2400" dirty="0" err="1"/>
-              <a:t>sapien</a:t>
-            </a:r>
-            <a:r>
-              <a:rPr lang="en-US" sz="2400" dirty="0"/>
-              <a:t> in </a:t>
-            </a:r>
-            <a:r>
-              <a:rPr lang="en-US" sz="2400" dirty="0" err="1"/>
-              <a:t>eros</a:t>
-            </a:r>
-            <a:r>
-              <a:rPr lang="en-US" sz="2400" dirty="0"/>
-              <a:t> </a:t>
-            </a:r>
-            <a:r>
-              <a:rPr lang="en-US" sz="2400" dirty="0" err="1"/>
-              <a:t>pretium</a:t>
-            </a:r>
-            <a:r>
-              <a:rPr lang="en-US" sz="2400" dirty="0"/>
-              <a:t> </a:t>
-            </a:r>
-            <a:r>
-              <a:rPr lang="en-US" sz="2400" dirty="0" err="1"/>
-              <a:t>porttitor</a:t>
-            </a:r>
-            <a:r>
-              <a:rPr lang="en-US" sz="2400" dirty="0"/>
-              <a:t>. </a:t>
-            </a:r>
-            <a:r>
-              <a:rPr lang="en-US" sz="2400" dirty="0" err="1"/>
-              <a:t>Nullam</a:t>
-            </a:r>
-            <a:r>
-              <a:rPr lang="en-US" sz="2400" dirty="0"/>
-              <a:t> </a:t>
-            </a:r>
-            <a:r>
-              <a:rPr lang="en-US" sz="2400" dirty="0" err="1"/>
-              <a:t>odio</a:t>
-            </a:r>
-            <a:r>
-              <a:rPr lang="en-US" sz="2400" dirty="0"/>
-              <a:t> </a:t>
-            </a:r>
-            <a:r>
-              <a:rPr lang="en-US" sz="2400" dirty="0" err="1"/>
-              <a:t>enim</a:t>
-            </a:r>
-            <a:r>
-              <a:rPr lang="en-US" sz="2400" dirty="0"/>
-              <a:t>, </a:t>
-            </a:r>
-            <a:r>
-              <a:rPr lang="en-US" sz="2400" dirty="0" err="1"/>
-              <a:t>elementum</a:t>
-            </a:r>
-            <a:r>
-              <a:rPr lang="en-US" sz="2400" dirty="0"/>
-              <a:t> sit </a:t>
-            </a:r>
-            <a:r>
-              <a:rPr lang="en-US" sz="2400" dirty="0" err="1"/>
-              <a:t>amet</a:t>
-            </a:r>
-            <a:r>
-              <a:rPr lang="en-US" sz="2400" dirty="0"/>
-              <a:t> cursus </a:t>
-            </a:r>
-            <a:r>
-              <a:rPr lang="en-US" sz="2400" dirty="0" err="1"/>
-              <a:t>nec</a:t>
-            </a:r>
-            <a:r>
-              <a:rPr lang="en-US" sz="2400" dirty="0"/>
-              <a:t>, </a:t>
-            </a:r>
-            <a:r>
-              <a:rPr lang="en-US" sz="2400" dirty="0" err="1"/>
-              <a:t>vehicula</a:t>
-            </a:r>
-            <a:r>
-              <a:rPr lang="en-US" sz="2400" dirty="0"/>
-              <a:t> vitae dui.</a:t>
-            </a:r>
-          </a:p>
-          <a:p>
-            <a:r>
-              <a:rPr lang="en-US" sz="2400" dirty="0" err="1"/>
-              <a:t>Suspendisse</a:t>
-            </a:r>
-            <a:r>
-              <a:rPr lang="en-US" sz="2400" dirty="0"/>
-              <a:t> </a:t>
-            </a:r>
-            <a:r>
-              <a:rPr lang="en-US" sz="2400" dirty="0" err="1"/>
-              <a:t>metus</a:t>
-            </a:r>
-            <a:r>
-              <a:rPr lang="en-US" sz="2400" dirty="0"/>
-              <a:t> ante, </a:t>
-            </a:r>
-            <a:r>
-              <a:rPr lang="en-US" sz="2400" dirty="0" err="1"/>
-              <a:t>laoreet</a:t>
-            </a:r>
-            <a:r>
-              <a:rPr lang="en-US" sz="2400" dirty="0"/>
-              <a:t> </a:t>
-            </a:r>
-            <a:r>
-              <a:rPr lang="en-US" sz="2400" dirty="0" err="1"/>
-              <a:t>nec</a:t>
-            </a:r>
-            <a:r>
-              <a:rPr lang="en-US" sz="2400" dirty="0"/>
-              <a:t> </a:t>
-            </a:r>
-            <a:r>
-              <a:rPr lang="en-US" sz="2400" dirty="0" err="1"/>
-              <a:t>urna</a:t>
-            </a:r>
-            <a:r>
-              <a:rPr lang="en-US" sz="2400" dirty="0"/>
-              <a:t> </a:t>
-            </a:r>
-            <a:r>
-              <a:rPr lang="en-US" sz="2400" dirty="0" err="1"/>
-              <a:t>eu</a:t>
-            </a:r>
-            <a:r>
-              <a:rPr lang="en-US" sz="2400" dirty="0"/>
-              <a:t>, convallis </a:t>
-            </a:r>
-            <a:r>
-              <a:rPr lang="en-US" sz="2400" dirty="0" err="1"/>
-              <a:t>hendrerit</a:t>
-            </a:r>
-            <a:r>
-              <a:rPr lang="en-US" sz="2400" dirty="0"/>
-              <a:t> libero. Duis ac </a:t>
-            </a:r>
-            <a:r>
-              <a:rPr lang="en-US" sz="2400" dirty="0" err="1"/>
-              <a:t>nisl</a:t>
-            </a:r>
-            <a:r>
-              <a:rPr lang="en-US" sz="2400" dirty="0"/>
-              <a:t> </a:t>
-            </a:r>
-            <a:r>
-              <a:rPr lang="en-US" sz="2400" dirty="0" err="1"/>
-              <a:t>risus</a:t>
-            </a:r>
-            <a:r>
-              <a:rPr lang="en-US" sz="2400" dirty="0"/>
-              <a:t>. </a:t>
-            </a:r>
-            <a:r>
-              <a:rPr lang="en-US" sz="2400" dirty="0" err="1"/>
-              <a:t>Sed</a:t>
-            </a:r>
-            <a:r>
-              <a:rPr lang="en-US" sz="2400" dirty="0"/>
-              <a:t> </a:t>
-            </a:r>
-            <a:r>
-              <a:rPr lang="en-US" sz="2400" dirty="0" err="1"/>
-              <a:t>luctus</a:t>
-            </a:r>
-            <a:r>
-              <a:rPr lang="en-US" sz="2400" dirty="0"/>
-              <a:t> </a:t>
-            </a:r>
-            <a:r>
-              <a:rPr lang="en-US" sz="2400" dirty="0" err="1"/>
-              <a:t>nulla</a:t>
-            </a:r>
-            <a:r>
-              <a:rPr lang="en-US" sz="2400" dirty="0"/>
-              <a:t> non </a:t>
-            </a:r>
-            <a:r>
-              <a:rPr lang="en-US" sz="2400" dirty="0" err="1"/>
-              <a:t>erat</a:t>
-            </a:r>
-            <a:r>
-              <a:rPr lang="en-US" sz="2400" dirty="0"/>
-              <a:t> pulvinar, </a:t>
-            </a:r>
-            <a:r>
-              <a:rPr lang="en-US" sz="2400" dirty="0" err="1"/>
-              <a:t>vel</a:t>
-            </a:r>
-            <a:r>
-              <a:rPr lang="en-US" sz="2400" dirty="0"/>
-              <a:t> </a:t>
-            </a:r>
-            <a:r>
-              <a:rPr lang="en-US" sz="2400" dirty="0" err="1"/>
-              <a:t>porttitor</a:t>
-            </a:r>
-            <a:r>
-              <a:rPr lang="en-US" sz="2400" dirty="0"/>
-              <a:t> </a:t>
-            </a:r>
-            <a:r>
-              <a:rPr lang="en-US" sz="2400" dirty="0" err="1"/>
-              <a:t>tellus</a:t>
-            </a:r>
-            <a:r>
-              <a:rPr lang="en-US" sz="2400" dirty="0"/>
-              <a:t> </a:t>
-            </a:r>
-            <a:r>
-              <a:rPr lang="en-US" sz="2400" dirty="0" err="1"/>
-              <a:t>pretium</a:t>
-            </a:r>
-            <a:r>
-              <a:rPr lang="en-US" sz="2400" dirty="0"/>
-              <a:t>. In fermentum </a:t>
-            </a:r>
-            <a:r>
-              <a:rPr lang="en-US" sz="2400" dirty="0" err="1"/>
-              <a:t>arcu</a:t>
-            </a:r>
-            <a:r>
-              <a:rPr lang="en-US" sz="2400" dirty="0"/>
-              <a:t> </a:t>
-            </a:r>
-            <a:r>
-              <a:rPr lang="en-US" sz="2400" dirty="0" err="1"/>
-              <a:t>ut</a:t>
-            </a:r>
-            <a:r>
-              <a:rPr lang="en-US" sz="2400" dirty="0"/>
-              <a:t> mi </a:t>
-            </a:r>
-            <a:r>
-              <a:rPr lang="en-US" sz="2400" dirty="0" err="1"/>
-              <a:t>mollis</a:t>
-            </a:r>
-            <a:r>
-              <a:rPr lang="en-US" sz="2400" dirty="0"/>
-              <a:t>, </a:t>
-            </a:r>
-            <a:r>
-              <a:rPr lang="en-US" sz="2400" dirty="0" err="1"/>
-              <a:t>nec</a:t>
-            </a:r>
-            <a:r>
-              <a:rPr lang="en-US" sz="2400" dirty="0"/>
-              <a:t> </a:t>
-            </a:r>
-            <a:r>
-              <a:rPr lang="en-US" sz="2400" dirty="0" err="1"/>
-              <a:t>iaculis</a:t>
-            </a:r>
-            <a:r>
-              <a:rPr lang="en-US" sz="2400" dirty="0"/>
-              <a:t> ipsum </a:t>
-            </a:r>
-            <a:r>
-              <a:rPr lang="en-US" sz="2400" dirty="0" err="1"/>
-              <a:t>rhoncus</a:t>
-            </a:r>
-            <a:r>
-              <a:rPr lang="en-US" sz="2400" dirty="0"/>
-              <a:t>. </a:t>
-            </a:r>
-            <a:r>
-              <a:rPr lang="en-US" sz="2400" dirty="0" err="1"/>
-              <a:t>Donec</a:t>
-            </a:r>
-            <a:r>
-              <a:rPr lang="en-US" sz="2400" dirty="0"/>
-              <a:t> cursus libero non </a:t>
-            </a:r>
-            <a:r>
-              <a:rPr lang="en-US" sz="2400" dirty="0" err="1"/>
-              <a:t>eros</a:t>
-            </a:r>
-            <a:r>
-              <a:rPr lang="en-US" sz="2400" dirty="0"/>
-              <a:t> </a:t>
-            </a:r>
-            <a:r>
-              <a:rPr lang="en-US" sz="2400" dirty="0" err="1"/>
-              <a:t>scelerisque</a:t>
-            </a:r>
-            <a:r>
-              <a:rPr lang="en-US" sz="2400" dirty="0"/>
-              <a:t> </a:t>
-            </a:r>
-            <a:r>
-              <a:rPr lang="en-US" sz="2400" dirty="0" err="1"/>
-              <a:t>euismod</a:t>
-            </a:r>
-            <a:r>
-              <a:rPr lang="en-US" sz="2400" dirty="0"/>
-              <a:t>. Nunc </a:t>
-            </a:r>
-            <a:r>
-              <a:rPr lang="en-US" sz="2400" dirty="0" err="1"/>
-              <a:t>diam</a:t>
-            </a:r>
-            <a:r>
-              <a:rPr lang="en-US" sz="2400" dirty="0"/>
-              <a:t> </a:t>
-            </a:r>
-            <a:r>
-              <a:rPr lang="en-US" sz="2400" dirty="0" err="1"/>
-              <a:t>arcu</a:t>
-            </a:r>
-            <a:r>
-              <a:rPr lang="en-US" sz="2400" dirty="0"/>
-              <a:t>, </a:t>
-            </a:r>
-            <a:r>
-              <a:rPr lang="en-US" sz="2400" dirty="0" err="1"/>
-              <a:t>aliquet</a:t>
-            </a:r>
-            <a:r>
-              <a:rPr lang="en-US" sz="2400" dirty="0"/>
-              <a:t> </a:t>
-            </a:r>
-            <a:r>
-              <a:rPr lang="en-US" sz="2400" dirty="0" err="1"/>
-              <a:t>eu</a:t>
-            </a:r>
-            <a:r>
-              <a:rPr lang="en-US" sz="2400" dirty="0"/>
-              <a:t> gravida vitae, </a:t>
-            </a:r>
-            <a:r>
-              <a:rPr lang="en-US" sz="2400" dirty="0" err="1"/>
-              <a:t>feugiat</a:t>
-            </a:r>
-            <a:r>
-              <a:rPr lang="en-US" sz="2400" dirty="0"/>
-              <a:t> </a:t>
-            </a:r>
-            <a:r>
-              <a:rPr lang="en-US" sz="2400" dirty="0" err="1"/>
-              <a:t>ut</a:t>
-            </a:r>
-            <a:r>
-              <a:rPr lang="en-US" sz="2400" dirty="0"/>
-              <a:t> </a:t>
-            </a:r>
-            <a:r>
-              <a:rPr lang="en-US" sz="2400" dirty="0" err="1"/>
-              <a:t>nulla</a:t>
-            </a:r>
-            <a:r>
-              <a:rPr lang="en-US" sz="2400" dirty="0"/>
-              <a:t>. Class </a:t>
-            </a:r>
-            <a:r>
-              <a:rPr lang="en-US" sz="2400" dirty="0" err="1"/>
-              <a:t>aptent</a:t>
-            </a:r>
-            <a:r>
-              <a:rPr lang="en-US" sz="2400" dirty="0"/>
-              <a:t> </a:t>
-            </a:r>
-            <a:r>
-              <a:rPr lang="en-US" sz="2400" dirty="0" err="1"/>
-              <a:t>taciti</a:t>
-            </a:r>
-            <a:r>
-              <a:rPr lang="en-US" sz="2400" dirty="0"/>
-              <a:t> </a:t>
-            </a:r>
-            <a:r>
-              <a:rPr lang="en-US" sz="2400" dirty="0" err="1"/>
-              <a:t>sociosqu</a:t>
-            </a:r>
-            <a:r>
-              <a:rPr lang="en-US" sz="2400" dirty="0"/>
-              <a:t> ad </a:t>
-            </a:r>
-            <a:r>
-              <a:rPr lang="en-US" sz="2400" dirty="0" err="1"/>
-              <a:t>litora</a:t>
-            </a:r>
-            <a:r>
-              <a:rPr lang="en-US" sz="2400" dirty="0"/>
-              <a:t> </a:t>
-            </a:r>
-            <a:r>
-              <a:rPr lang="en-US" sz="2400" dirty="0" err="1"/>
-              <a:t>torquent</a:t>
-            </a:r>
-            <a:r>
-              <a:rPr lang="en-US" sz="2400" dirty="0"/>
-              <a:t> per </a:t>
-            </a:r>
-            <a:r>
-              <a:rPr lang="en-US" sz="2400" dirty="0" err="1"/>
-              <a:t>conubia</a:t>
-            </a:r>
-            <a:r>
-              <a:rPr lang="en-US" sz="2400" dirty="0"/>
-              <a:t> nostra, per </a:t>
-            </a:r>
-            <a:r>
-              <a:rPr lang="en-US" sz="2400" dirty="0" err="1"/>
-              <a:t>inceptos</a:t>
-            </a:r>
-            <a:r>
-              <a:rPr lang="en-US" sz="2400" dirty="0"/>
-              <a:t> </a:t>
-            </a:r>
-            <a:r>
-              <a:rPr lang="en-US" sz="2400" dirty="0" err="1"/>
-              <a:t>himenaeos</a:t>
-            </a:r>
-            <a:r>
-              <a:rPr lang="en-US" sz="2400" dirty="0"/>
-              <a:t>.</a:t>
-            </a:r>
-          </a:p>
-          <a:p>
-            <a:r>
-              <a:rPr lang="en-US" sz="2400" dirty="0" err="1"/>
-              <a:t>Aenean</a:t>
-            </a:r>
-            <a:r>
-              <a:rPr lang="en-US" sz="2400" dirty="0"/>
-              <a:t> </a:t>
-            </a:r>
-            <a:r>
-              <a:rPr lang="en-US" sz="2400" dirty="0" err="1"/>
-              <a:t>mattis</a:t>
-            </a:r>
-            <a:r>
-              <a:rPr lang="en-US" sz="2400" dirty="0"/>
-              <a:t> </a:t>
-            </a:r>
-            <a:r>
-              <a:rPr lang="en-US" sz="2400" dirty="0" err="1"/>
-              <a:t>eros</a:t>
-            </a:r>
-            <a:r>
-              <a:rPr lang="en-US" sz="2400" dirty="0"/>
-              <a:t> vitae </a:t>
-            </a:r>
-            <a:r>
-              <a:rPr lang="en-US" sz="2400" dirty="0" err="1"/>
-              <a:t>neque</a:t>
-            </a:r>
-            <a:r>
-              <a:rPr lang="en-US" sz="2400" dirty="0"/>
-              <a:t> </a:t>
-            </a:r>
-            <a:r>
-              <a:rPr lang="en-US" sz="2400" dirty="0" err="1"/>
-              <a:t>varius</a:t>
-            </a:r>
-            <a:r>
-              <a:rPr lang="en-US" sz="2400" dirty="0"/>
-              <a:t> </a:t>
-            </a:r>
-            <a:r>
-              <a:rPr lang="en-US" sz="2400" dirty="0" err="1"/>
-              <a:t>commodo</a:t>
-            </a:r>
-            <a:r>
-              <a:rPr lang="en-US" sz="2400" dirty="0"/>
-              <a:t> </a:t>
-            </a:r>
-            <a:r>
-              <a:rPr lang="en-US" sz="2400" dirty="0" err="1"/>
-              <a:t>ut</a:t>
-            </a:r>
-            <a:r>
-              <a:rPr lang="en-US" sz="2400" dirty="0"/>
-              <a:t> </a:t>
-            </a:r>
-            <a:r>
-              <a:rPr lang="en-US" sz="2400" dirty="0" err="1"/>
-              <a:t>sed</a:t>
-            </a:r>
-            <a:r>
-              <a:rPr lang="en-US" sz="2400" dirty="0"/>
-              <a:t> </a:t>
-            </a:r>
-            <a:r>
-              <a:rPr lang="en-US" sz="2400" dirty="0" err="1"/>
-              <a:t>quam</a:t>
-            </a:r>
-            <a:r>
-              <a:rPr lang="en-US" sz="2400" dirty="0"/>
-              <a:t>. </a:t>
-            </a:r>
-            <a:r>
-              <a:rPr lang="en-US" sz="2400" dirty="0" err="1"/>
-              <a:t>Etiam</a:t>
-            </a:r>
-            <a:r>
-              <a:rPr lang="en-US" sz="2400" dirty="0"/>
-              <a:t> </a:t>
-            </a:r>
-            <a:r>
-              <a:rPr lang="en-US" sz="2400" dirty="0" err="1"/>
-              <a:t>ut</a:t>
-            </a:r>
-            <a:r>
-              <a:rPr lang="en-US" sz="2400" dirty="0"/>
-              <a:t> </a:t>
-            </a:r>
-            <a:r>
-              <a:rPr lang="en-US" sz="2400" dirty="0" err="1"/>
-              <a:t>purus</a:t>
-            </a:r>
-            <a:r>
-              <a:rPr lang="en-US" sz="2400" dirty="0"/>
-              <a:t> </a:t>
-            </a:r>
-            <a:r>
-              <a:rPr lang="en-US" sz="2400" dirty="0" err="1"/>
-              <a:t>vel</a:t>
-            </a:r>
-            <a:r>
-              <a:rPr lang="en-US" sz="2400" dirty="0"/>
-              <a:t> </a:t>
-            </a:r>
-            <a:r>
-              <a:rPr lang="en-US" sz="2400" dirty="0" err="1"/>
-              <a:t>urna</a:t>
-            </a:r>
-            <a:r>
-              <a:rPr lang="en-US" sz="2400" dirty="0"/>
-              <a:t> </a:t>
-            </a:r>
-            <a:r>
-              <a:rPr lang="en-US" sz="2400" dirty="0" err="1"/>
-              <a:t>facilisis</a:t>
-            </a:r>
-            <a:r>
-              <a:rPr lang="en-US" sz="2400" dirty="0"/>
-              <a:t> </a:t>
-            </a:r>
-            <a:r>
-              <a:rPr lang="en-US" sz="2400" dirty="0" err="1"/>
-              <a:t>porttitor</a:t>
-            </a:r>
-            <a:r>
-              <a:rPr lang="en-US" sz="2400" dirty="0"/>
-              <a:t> in </a:t>
-            </a:r>
-            <a:r>
-              <a:rPr lang="en-US" sz="2400" dirty="0" err="1"/>
-              <a:t>sed</a:t>
-            </a:r>
-            <a:r>
-              <a:rPr lang="en-US" sz="2400" dirty="0"/>
-              <a:t> </a:t>
-            </a:r>
-            <a:r>
-              <a:rPr lang="en-US" sz="2400" dirty="0" err="1"/>
-              <a:t>odio</a:t>
-            </a:r>
-            <a:r>
-              <a:rPr lang="en-US" sz="2400" dirty="0"/>
-              <a:t>. </a:t>
-            </a:r>
-            <a:endParaRPr lang="en-US" sz="1600" dirty="0">
-              <a:solidFill>
-                <a:srgbClr val="2E2D29"/>
-              </a:solidFill>
-            </a:endParaRPr>
-          </a:p>
-        </p:txBody>
-      </p:sp>
       <p:grpSp>
         <p:nvGrpSpPr>
           <p:cNvPr id="31" name="Group 30">
@@ -5867,8 +5220,8 @@
         </p:nvSpPr>
         <p:spPr>
           <a:xfrm>
-            <a:off x="7685170" y="597483"/>
-            <a:ext cx="21270830" cy="1015663"/>
+            <a:off x="6518031" y="597483"/>
+            <a:ext cx="23309868" cy="1938992"/>
           </a:xfrm>
           <a:prstGeom prst="rect">
             <a:avLst/>
@@ -5889,8 +5242,35 @@
                 </a:solidFill>
                 <a:latin typeface="Source Sans Pro Regular"/>
               </a:rPr>
-              <a:t>Poster Title: Poster Subtitle</a:t>
-            </a:r>
+              <a:t>So you think ADMM is fast, huh? Try the GPU-</a:t>
+            </a:r>
+            <a:r>
+              <a:rPr lang="en-US" sz="6000" dirty="0" err="1">
+                <a:solidFill>
+                  <a:schemeClr val="bg1"/>
+                </a:solidFill>
+                <a:latin typeface="Source Sans Pro Regular"/>
+              </a:rPr>
+              <a:t>ified</a:t>
+            </a:r>
+            <a:r>
+              <a:rPr lang="en-US" sz="6000" dirty="0">
+                <a:solidFill>
+                  <a:schemeClr val="bg1"/>
+                </a:solidFill>
+                <a:latin typeface="Source Sans Pro Regular"/>
+              </a:rPr>
+              <a:t> interior-point method</a:t>
+            </a:r>
+          </a:p>
+          <a:p>
+            <a:pPr algn="ctr"/>
+            <a:endParaRPr lang="en-US" sz="6000" dirty="0">
+              <a:solidFill>
+                <a:schemeClr val="bg1"/>
+              </a:solidFill>
+              <a:latin typeface="Source Sans Pro Regular"/>
+            </a:endParaRPr>
           </a:p>
         </p:txBody>
       </p:sp>
@@ -5938,7 +5318,7 @@
         </p:nvSpPr>
         <p:spPr>
           <a:xfrm>
-            <a:off x="29827899" y="3413404"/>
+            <a:off x="29745888" y="3413404"/>
             <a:ext cx="3752491" cy="471989"/>
           </a:xfrm>
           <a:prstGeom prst="rect">
@@ -5959,7 +5339,7 @@
                 </a:solidFill>
                 <a:latin typeface="Source Sans Pro Regular"/>
               </a:rPr>
-              <a:t>Department Name</a:t>
+              <a:t>Electrical Engineering</a:t>
             </a:r>
           </a:p>
         </p:txBody>
@@ -6000,7 +5380,7 @@
                 </a:solidFill>
                 <a:latin typeface="Source Sans Pro Italic"/>
               </a:rPr>
-              <a:t>First1 Last1,</a:t>
+              <a:t>Frank DeGuire III,</a:t>
             </a:r>
             <a:r>
               <a:rPr lang="en-US" sz="4000" i="1" baseline="30000" dirty="0">
@@ -6018,7 +5398,7 @@
                 </a:solidFill>
                 <a:latin typeface="Source Sans Pro Italic"/>
               </a:rPr>
-              <a:t> First2 Last2,</a:t>
+              <a:t> Emanuel Herberthson,</a:t>
             </a:r>
             <a:r>
               <a:rPr lang="en-US" sz="4000" i="1" baseline="30000" dirty="0">
@@ -6028,24 +5408,6 @@
                 <a:latin typeface="Source Sans Pro Italic"/>
               </a:rPr>
               <a:t>1</a:t>
-            </a:r>
-            <a:r>
-              <a:rPr lang="en-US" sz="4000" i="1" dirty="0">
-                <a:solidFill>
-                  <a:schemeClr val="bg1"/>
-                </a:solidFill>
-                <a:latin typeface="Source Sans Pro Italic"/>
-              </a:rPr>
-              <a:t> First3, Last3</a:t>
-            </a:r>
-            <a:r>
-              <a:rPr lang="en-US" sz="4000" i="1" baseline="30000" dirty="0">
-                <a:solidFill>
-                  <a:schemeClr val="bg1"/>
-                </a:solidFill>
-                <a:latin typeface="Source Sans Pro Italic"/>
-              </a:rPr>
-              <a:t>1,2</a:t>
             </a:r>
             <a:endParaRPr lang="en-US" sz="4000" i="1" dirty="0">
               <a:solidFill>
@@ -6101,57 +5463,7 @@
                 </a:solidFill>
                 <a:latin typeface="Source Sans Pro Italic"/>
               </a:rPr>
-              <a:t>Example Lab, Department Name, Stanford University</a:t>
-            </a:r>
-          </a:p>
-        </p:txBody>
-      </p:sp>
-      <p:sp>
-        <p:nvSpPr>
-          <p:cNvPr id="39" name="TextBox 38">
-            <a:extLst>
-              <a:ext uri="{FF2B5EF4-FFF2-40B4-BE49-F238E27FC236}">
-                <a16:creationId xmlns:a16="http://schemas.microsoft.com/office/drawing/2014/main" id="{49741301-AFA9-8F45-BB67-4B379BDD3140}"/>
-              </a:ext>
-            </a:extLst>
-          </p:cNvPr>
-          <p:cNvSpPr txBox="1"/>
-          <p:nvPr/>
-        </p:nvSpPr>
-        <p:spPr>
-          <a:xfrm>
-            <a:off x="7685169" y="2762098"/>
-            <a:ext cx="21270830" cy="523220"/>
-          </a:xfrm>
-          <a:prstGeom prst="rect">
-            <a:avLst/>
-          </a:prstGeom>
-          <a:noFill/>
-        </p:spPr>
-        <p:txBody>
-          <a:bodyPr wrap="square" rtlCol="0">
-            <a:spAutoFit/>
-          </a:bodyPr>
-          <a:lstStyle/>
-          <a:p>
-            <a:pPr algn="ctr"/>
-            <a:r>
-              <a:rPr lang="en-US" sz="2800" i="1" baseline="30000" dirty="0">
-                <a:solidFill>
-                  <a:schemeClr val="bg1"/>
-                </a:solidFill>
-                <a:latin typeface="Source Sans Pro Italic"/>
-              </a:rPr>
-              <a:t>2</a:t>
-            </a:r>
-            <a:r>
-              <a:rPr lang="en-US" sz="2800" i="1" dirty="0">
-                <a:solidFill>
-                  <a:schemeClr val="bg1"/>
-                </a:solidFill>
-                <a:latin typeface="Source Sans Pro Italic"/>
-              </a:rPr>
-              <a:t>Example Lab, Department Name2, Other University</a:t>
+              <a:t>Electrical Engineering, Stanford University</a:t>
             </a:r>
           </a:p>
         </p:txBody>
@@ -6191,7 +5503,7 @@
           <p:spPr>
             <a:xfrm>
               <a:off x="7655317" y="6043852"/>
-              <a:ext cx="6047810" cy="969496"/>
+              <a:ext cx="2698335" cy="969496"/>
             </a:xfrm>
             <a:prstGeom prst="rect">
               <a:avLst/>
@@ -6211,7 +5523,7 @@
                   </a:solidFill>
                   <a:latin typeface="Source Sans Pro Regular"/>
                 </a:rPr>
-                <a:t>Example Section 1</a:t>
+                <a:t>Abstract</a:t>
               </a:r>
             </a:p>
           </p:txBody>
@@ -6290,7 +5602,7 @@
         </p:nvGrpSpPr>
         <p:grpSpPr>
           <a:xfrm>
-            <a:off x="8533581" y="4097903"/>
+            <a:off x="173590" y="10340523"/>
             <a:ext cx="7374264" cy="784322"/>
             <a:chOff x="7655317" y="6043852"/>
             <a:chExt cx="11061396" cy="1176482"/>
@@ -6311,7 +5623,7 @@
           <p:spPr>
             <a:xfrm>
               <a:off x="7655317" y="6043852"/>
-              <a:ext cx="6047810" cy="969496"/>
+              <a:ext cx="4400724" cy="969496"/>
             </a:xfrm>
             <a:prstGeom prst="rect">
               <a:avLst/>
@@ -6331,7 +5643,7 @@
                   </a:solidFill>
                   <a:latin typeface="Source Sans Pro Regular"/>
                 </a:rPr>
-                <a:t>Example Section 2</a:t>
+                <a:t>Phases I and II</a:t>
               </a:r>
             </a:p>
           </p:txBody>
@@ -6410,8 +5722,8 @@
         </p:nvGrpSpPr>
         <p:grpSpPr>
           <a:xfrm>
-            <a:off x="16846360" y="4097903"/>
-            <a:ext cx="7374264" cy="784322"/>
+            <a:off x="8685981" y="8123195"/>
+            <a:ext cx="7374263" cy="784321"/>
             <a:chOff x="7655317" y="6043852"/>
             <a:chExt cx="11061396" cy="1176482"/>
           </a:xfrm>
@@ -6431,7 +5743,7 @@
           <p:spPr>
             <a:xfrm>
               <a:off x="7655317" y="6043852"/>
-              <a:ext cx="6047810" cy="969496"/>
+              <a:ext cx="6944692" cy="969497"/>
             </a:xfrm>
             <a:prstGeom prst="rect">
               <a:avLst/>
@@ -6451,7 +5763,7 @@
                   </a:solidFill>
                   <a:latin typeface="Source Sans Pro Regular"/>
                 </a:rPr>
-                <a:t>Example Section 3</a:t>
+                <a:t>Results generated data</a:t>
               </a:r>
             </a:p>
           </p:txBody>
@@ -6530,7 +5842,7 @@
         </p:nvGrpSpPr>
         <p:grpSpPr>
           <a:xfrm>
-            <a:off x="25159140" y="4097903"/>
+            <a:off x="19837558" y="4231427"/>
             <a:ext cx="7374264" cy="784322"/>
             <a:chOff x="7655317" y="6043852"/>
             <a:chExt cx="11061396" cy="1176482"/>
@@ -6551,7 +5863,7 @@
           <p:spPr>
             <a:xfrm>
               <a:off x="7655317" y="6043852"/>
-              <a:ext cx="6047810" cy="969496"/>
+              <a:ext cx="5980484" cy="969496"/>
             </a:xfrm>
             <a:prstGeom prst="rect">
               <a:avLst/>
@@ -6571,7 +5883,7 @@
                   </a:solidFill>
                   <a:latin typeface="Source Sans Pro Regular"/>
                 </a:rPr>
-                <a:t>Example Section 4</a:t>
+                <a:t>Results MIPLIB data</a:t>
               </a:r>
             </a:p>
           </p:txBody>
@@ -6636,6 +5948,1576 @@
           </p:txBody>
         </p:sp>
       </p:grpSp>
+      <p:sp>
+        <p:nvSpPr>
+          <p:cNvPr id="5" name="TextBox 4">
+            <a:extLst>
+              <a:ext uri="{FF2B5EF4-FFF2-40B4-BE49-F238E27FC236}">
+                <a16:creationId xmlns:a16="http://schemas.microsoft.com/office/drawing/2014/main" id="{803AF0D2-874C-6586-A371-A829CE4579B2}"/>
+              </a:ext>
+            </a:extLst>
+          </p:cNvPr>
+          <p:cNvSpPr txBox="1"/>
+          <p:nvPr/>
+        </p:nvSpPr>
+        <p:spPr>
+          <a:xfrm>
+            <a:off x="279865" y="5015749"/>
+            <a:ext cx="7809058" cy="5078313"/>
+          </a:xfrm>
+          <a:prstGeom prst="rect">
+            <a:avLst/>
+          </a:prstGeom>
+          <a:noFill/>
+        </p:spPr>
+        <p:txBody>
+          <a:bodyPr wrap="square" rtlCol="0">
+            <a:spAutoFit/>
+          </a:bodyPr>
+          <a:lstStyle/>
+          <a:p>
+            <a:r>
+              <a:rPr lang="sv-SE" sz="3600" dirty="0" err="1"/>
+              <a:t>With</a:t>
+            </a:r>
+            <a:r>
+              <a:rPr lang="sv-SE" sz="3600" dirty="0"/>
+              <a:t> GPUs </a:t>
+            </a:r>
+            <a:r>
+              <a:rPr lang="sv-SE" sz="3600" dirty="0" err="1"/>
+              <a:t>becoming</a:t>
+            </a:r>
+            <a:r>
+              <a:rPr lang="sv-SE" sz="3600" dirty="0"/>
+              <a:t> </a:t>
+            </a:r>
+            <a:r>
+              <a:rPr lang="sv-SE" sz="3600" dirty="0" err="1"/>
+              <a:t>increasingly</a:t>
+            </a:r>
+            <a:r>
+              <a:rPr lang="sv-SE" sz="3600" dirty="0"/>
+              <a:t> </a:t>
+            </a:r>
+            <a:r>
+              <a:rPr lang="sv-SE" sz="3600" dirty="0" err="1"/>
+              <a:t>more</a:t>
+            </a:r>
+            <a:r>
+              <a:rPr lang="sv-SE" sz="3600" dirty="0"/>
+              <a:t> </a:t>
+            </a:r>
+            <a:r>
+              <a:rPr lang="sv-SE" sz="3600" dirty="0" err="1"/>
+              <a:t>powerful</a:t>
+            </a:r>
+            <a:r>
+              <a:rPr lang="sv-SE" sz="3600" dirty="0"/>
+              <a:t>, </a:t>
+            </a:r>
+            <a:r>
+              <a:rPr lang="sv-SE" sz="3600" dirty="0" err="1"/>
+              <a:t>this</a:t>
+            </a:r>
+            <a:r>
+              <a:rPr lang="sv-SE" sz="3600" dirty="0"/>
+              <a:t> presents an </a:t>
+            </a:r>
+            <a:r>
+              <a:rPr lang="sv-SE" sz="3600" dirty="0" err="1"/>
+              <a:t>opportunity</a:t>
+            </a:r>
+            <a:r>
+              <a:rPr lang="sv-SE" sz="3600" dirty="0"/>
+              <a:t> to speed </a:t>
+            </a:r>
+            <a:r>
+              <a:rPr lang="sv-SE" sz="3600" dirty="0" err="1"/>
+              <a:t>up</a:t>
+            </a:r>
+            <a:r>
+              <a:rPr lang="sv-SE" sz="3600" dirty="0"/>
+              <a:t> </a:t>
+            </a:r>
+            <a:r>
+              <a:rPr lang="sv-SE" sz="3600" dirty="0" err="1"/>
+              <a:t>algorithms</a:t>
+            </a:r>
+            <a:r>
+              <a:rPr lang="sv-SE" sz="3600" dirty="0"/>
+              <a:t> </a:t>
+            </a:r>
+            <a:r>
+              <a:rPr lang="sv-SE" sz="3600" dirty="0" err="1"/>
+              <a:t>which</a:t>
+            </a:r>
+            <a:r>
+              <a:rPr lang="sv-SE" sz="3600" dirty="0"/>
+              <a:t> </a:t>
+            </a:r>
+            <a:r>
+              <a:rPr lang="sv-SE" sz="3600" dirty="0" err="1"/>
+              <a:t>rely</a:t>
+            </a:r>
+            <a:r>
+              <a:rPr lang="sv-SE" sz="3600" dirty="0"/>
+              <a:t> </a:t>
+            </a:r>
+            <a:r>
+              <a:rPr lang="sv-SE" sz="3600" dirty="0" err="1"/>
+              <a:t>heavily</a:t>
+            </a:r>
+            <a:r>
+              <a:rPr lang="sv-SE" sz="3600" dirty="0"/>
+              <a:t> on matrix operations. </a:t>
+            </a:r>
+            <a:r>
+              <a:rPr lang="sv-SE" sz="3600" dirty="0" err="1"/>
+              <a:t>Leveraging</a:t>
+            </a:r>
+            <a:r>
+              <a:rPr lang="sv-SE" sz="3600" dirty="0"/>
+              <a:t> </a:t>
+            </a:r>
+            <a:r>
+              <a:rPr lang="sv-SE" sz="3600" dirty="0" err="1"/>
+              <a:t>this</a:t>
+            </a:r>
+            <a:r>
+              <a:rPr lang="sv-SE" sz="3600" dirty="0"/>
+              <a:t> </a:t>
+            </a:r>
+            <a:r>
+              <a:rPr lang="sv-SE" sz="3600" dirty="0" err="1"/>
+              <a:t>fact</a:t>
+            </a:r>
+            <a:r>
+              <a:rPr lang="sv-SE" sz="3600" dirty="0"/>
+              <a:t>, </a:t>
+            </a:r>
+            <a:r>
+              <a:rPr lang="sv-SE" sz="3600" dirty="0" err="1"/>
+              <a:t>this</a:t>
+            </a:r>
+            <a:r>
+              <a:rPr lang="sv-SE" sz="3600" dirty="0"/>
+              <a:t> </a:t>
+            </a:r>
+            <a:r>
+              <a:rPr lang="sv-SE" sz="3600" dirty="0" err="1"/>
+              <a:t>project</a:t>
+            </a:r>
+            <a:r>
+              <a:rPr lang="sv-SE" sz="3600" dirty="0"/>
+              <a:t> </a:t>
+            </a:r>
+            <a:r>
+              <a:rPr lang="sv-SE" sz="3600" dirty="0" err="1"/>
+              <a:t>implements</a:t>
+            </a:r>
+            <a:r>
+              <a:rPr lang="sv-SE" sz="3600" dirty="0"/>
+              <a:t> a GPU </a:t>
+            </a:r>
+            <a:r>
+              <a:rPr lang="sv-SE" sz="3600" dirty="0" err="1"/>
+              <a:t>accelerated</a:t>
+            </a:r>
+            <a:r>
+              <a:rPr lang="sv-SE" sz="3600" dirty="0"/>
+              <a:t> LP-, QP and SOCP-</a:t>
+            </a:r>
+            <a:r>
+              <a:rPr lang="sv-SE" sz="3600" dirty="0" err="1"/>
+              <a:t>solver</a:t>
+            </a:r>
+            <a:r>
+              <a:rPr lang="sv-SE" sz="3600" dirty="0"/>
+              <a:t> </a:t>
+            </a:r>
+            <a:r>
+              <a:rPr lang="sv-SE" sz="3600" dirty="0" err="1"/>
+              <a:t>based</a:t>
+            </a:r>
+            <a:r>
+              <a:rPr lang="sv-SE" sz="3600" dirty="0"/>
+              <a:t> on </a:t>
+            </a:r>
+            <a:r>
+              <a:rPr lang="sv-SE" sz="3600" dirty="0" err="1"/>
+              <a:t>using</a:t>
+            </a:r>
+            <a:r>
+              <a:rPr lang="sv-SE" sz="3600" dirty="0"/>
+              <a:t> the </a:t>
+            </a:r>
+            <a:r>
+              <a:rPr lang="sv-SE" sz="3600" dirty="0" err="1"/>
+              <a:t>interior</a:t>
+            </a:r>
+            <a:r>
+              <a:rPr lang="sv-SE" sz="3600" dirty="0"/>
+              <a:t> </a:t>
+            </a:r>
+            <a:r>
+              <a:rPr lang="sv-SE" sz="3600" dirty="0" err="1"/>
+              <a:t>point</a:t>
+            </a:r>
+            <a:r>
+              <a:rPr lang="sv-SE" sz="3600" dirty="0"/>
+              <a:t> </a:t>
+            </a:r>
+            <a:r>
+              <a:rPr lang="sv-SE" sz="3600" dirty="0" err="1"/>
+              <a:t>algorithm</a:t>
+            </a:r>
+            <a:r>
+              <a:rPr lang="sv-SE" sz="3600" dirty="0"/>
+              <a:t>. As a bonus, a Lasso-</a:t>
+            </a:r>
+            <a:r>
+              <a:rPr lang="sv-SE" sz="3600" dirty="0" err="1"/>
+              <a:t>solver</a:t>
+            </a:r>
+            <a:r>
+              <a:rPr lang="sv-SE" sz="3600" dirty="0"/>
+              <a:t> </a:t>
+            </a:r>
+            <a:r>
+              <a:rPr lang="sv-SE" sz="3600" dirty="0" err="1"/>
+              <a:t>was</a:t>
+            </a:r>
+            <a:r>
+              <a:rPr lang="sv-SE" sz="3600" dirty="0"/>
+              <a:t> </a:t>
+            </a:r>
+            <a:r>
+              <a:rPr lang="sv-SE" sz="3600" dirty="0" err="1"/>
+              <a:t>implemented</a:t>
+            </a:r>
+            <a:r>
+              <a:rPr lang="sv-SE" sz="3600" dirty="0"/>
+              <a:t> </a:t>
+            </a:r>
+            <a:r>
+              <a:rPr lang="sv-SE" sz="3600" dirty="0" err="1"/>
+              <a:t>using</a:t>
+            </a:r>
+            <a:r>
+              <a:rPr lang="sv-SE" sz="3600" dirty="0"/>
+              <a:t> ADMM.</a:t>
+            </a:r>
+          </a:p>
+        </p:txBody>
+      </p:sp>
+      <p:grpSp>
+        <p:nvGrpSpPr>
+          <p:cNvPr id="8" name="Group 7">
+            <a:extLst>
+              <a:ext uri="{FF2B5EF4-FFF2-40B4-BE49-F238E27FC236}">
+                <a16:creationId xmlns:a16="http://schemas.microsoft.com/office/drawing/2014/main" id="{C4749C31-9C90-AAF8-4B2B-D967D35CEE4B}"/>
+              </a:ext>
+            </a:extLst>
+          </p:cNvPr>
+          <p:cNvGrpSpPr/>
+          <p:nvPr/>
+        </p:nvGrpSpPr>
+        <p:grpSpPr>
+          <a:xfrm>
+            <a:off x="8685981" y="4087467"/>
+            <a:ext cx="7374264" cy="784322"/>
+            <a:chOff x="7655317" y="6043852"/>
+            <a:chExt cx="11061396" cy="1176482"/>
+          </a:xfrm>
+        </p:grpSpPr>
+        <p:sp>
+          <p:nvSpPr>
+            <p:cNvPr id="9" name="TextBox 8">
+              <a:extLst>
+                <a:ext uri="{FF2B5EF4-FFF2-40B4-BE49-F238E27FC236}">
+                  <a16:creationId xmlns:a16="http://schemas.microsoft.com/office/drawing/2014/main" id="{13742041-92E4-C2BB-7B8D-3E53B4C31D1D}"/>
+                </a:ext>
+              </a:extLst>
+            </p:cNvPr>
+            <p:cNvSpPr txBox="1"/>
+            <p:nvPr/>
+          </p:nvSpPr>
+          <p:spPr>
+            <a:xfrm>
+              <a:off x="7655317" y="6043852"/>
+              <a:ext cx="2414604" cy="969496"/>
+            </a:xfrm>
+            <a:prstGeom prst="rect">
+              <a:avLst/>
+            </a:prstGeom>
+            <a:noFill/>
+          </p:spPr>
+          <p:txBody>
+            <a:bodyPr wrap="none" rtlCol="0">
+              <a:spAutoFit/>
+            </a:bodyPr>
+            <a:lstStyle/>
+            <a:p>
+              <a:r>
+                <a:rPr lang="en-US" sz="3600" dirty="0">
+                  <a:solidFill>
+                    <a:srgbClr val="2E2D29"/>
+                  </a:solidFill>
+                  <a:latin typeface="Source Sans Pro Regular"/>
+                </a:rPr>
+                <a:t>Testing</a:t>
+              </a:r>
+            </a:p>
+          </p:txBody>
+        </p:sp>
+        <p:sp>
+          <p:nvSpPr>
+            <p:cNvPr id="12" name="Rectangle 11">
+              <a:extLst>
+                <a:ext uri="{FF2B5EF4-FFF2-40B4-BE49-F238E27FC236}">
+                  <a16:creationId xmlns:a16="http://schemas.microsoft.com/office/drawing/2014/main" id="{5159CEDA-1F49-DCFB-385F-600872F6284A}"/>
+                </a:ext>
+              </a:extLst>
+            </p:cNvPr>
+            <p:cNvSpPr/>
+            <p:nvPr/>
+          </p:nvSpPr>
+          <p:spPr>
+            <a:xfrm>
+              <a:off x="7743913" y="7174616"/>
+              <a:ext cx="10972800" cy="45718"/>
+            </a:xfrm>
+            <a:prstGeom prst="rect">
+              <a:avLst/>
+            </a:prstGeom>
+            <a:solidFill>
+              <a:srgbClr val="D2C295"/>
+            </a:solidFill>
+            <a:ln>
+              <a:solidFill>
+                <a:srgbClr val="D2C295"/>
+              </a:solidFill>
+            </a:ln>
+          </p:spPr>
+          <p:style>
+            <a:lnRef idx="2">
+              <a:schemeClr val="accent1">
+                <a:shade val="50000"/>
+              </a:schemeClr>
+            </a:lnRef>
+            <a:fillRef idx="1">
+              <a:schemeClr val="accent1"/>
+            </a:fillRef>
+            <a:effectRef idx="0">
+              <a:schemeClr val="accent1"/>
+            </a:effectRef>
+            <a:fontRef idx="minor">
+              <a:schemeClr val="lt1"/>
+            </a:fontRef>
+          </p:style>
+          <p:txBody>
+            <a:bodyPr rot="0" spcFirstLastPara="0" vertOverflow="overflow" horzOverflow="overflow" vert="horz" wrap="square" lIns="60960" tIns="30480" rIns="60960" bIns="30480" numCol="1" spcCol="0" rtlCol="0" fromWordArt="0" anchor="ctr" anchorCtr="0" forceAA="0" compatLnSpc="1">
+              <a:prstTxWarp prst="textNoShape">
+                <a:avLst/>
+              </a:prstTxWarp>
+              <a:noAutofit/>
+            </a:bodyPr>
+            <a:lstStyle/>
+            <a:p>
+              <a:pPr algn="ctr"/>
+              <a:endParaRPr lang="en-US" sz="3456"/>
+            </a:p>
+          </p:txBody>
+        </p:sp>
+      </p:grpSp>
+      <p:sp>
+        <p:nvSpPr>
+          <p:cNvPr id="13" name="TextBox 12">
+            <a:extLst>
+              <a:ext uri="{FF2B5EF4-FFF2-40B4-BE49-F238E27FC236}">
+                <a16:creationId xmlns:a16="http://schemas.microsoft.com/office/drawing/2014/main" id="{34E70C0A-4F4B-8102-6359-AACDBB7F56C2}"/>
+              </a:ext>
+            </a:extLst>
+          </p:cNvPr>
+          <p:cNvSpPr txBox="1"/>
+          <p:nvPr/>
+        </p:nvSpPr>
+        <p:spPr>
+          <a:xfrm>
+            <a:off x="220802" y="11232357"/>
+            <a:ext cx="7315200" cy="1200329"/>
+          </a:xfrm>
+          <a:prstGeom prst="rect">
+            <a:avLst/>
+          </a:prstGeom>
+          <a:noFill/>
+        </p:spPr>
+        <p:txBody>
+          <a:bodyPr wrap="square" rtlCol="0">
+            <a:spAutoFit/>
+          </a:bodyPr>
+          <a:lstStyle/>
+          <a:p>
+            <a:r>
+              <a:rPr lang="sv-SE" sz="3600" dirty="0" err="1"/>
+              <a:t>Phase</a:t>
+            </a:r>
+            <a:r>
+              <a:rPr lang="sv-SE" sz="3600" dirty="0"/>
+              <a:t> I </a:t>
+            </a:r>
+            <a:r>
+              <a:rPr lang="sv-SE" sz="3600" dirty="0" err="1"/>
+              <a:t>found</a:t>
+            </a:r>
+            <a:r>
+              <a:rPr lang="sv-SE" sz="3600" dirty="0"/>
+              <a:t> a </a:t>
+            </a:r>
+            <a:r>
+              <a:rPr lang="sv-SE" sz="3600" dirty="0" err="1"/>
+              <a:t>strictly</a:t>
+            </a:r>
+            <a:r>
+              <a:rPr lang="sv-SE" sz="3600" dirty="0"/>
+              <a:t> </a:t>
+            </a:r>
+            <a:r>
+              <a:rPr lang="sv-SE" sz="3600" dirty="0" err="1"/>
+              <a:t>feasible</a:t>
+            </a:r>
+            <a:r>
+              <a:rPr lang="sv-SE" sz="3600" dirty="0"/>
+              <a:t> </a:t>
+            </a:r>
+            <a:r>
+              <a:rPr lang="sv-SE" sz="3600" dirty="0" err="1"/>
+              <a:t>point</a:t>
+            </a:r>
+            <a:r>
+              <a:rPr lang="sv-SE" sz="3600" dirty="0"/>
+              <a:t> </a:t>
+            </a:r>
+            <a:r>
+              <a:rPr lang="sv-SE" sz="3600" dirty="0" err="1"/>
+              <a:t>through</a:t>
+            </a:r>
+            <a:r>
+              <a:rPr lang="sv-SE" sz="3600" dirty="0"/>
+              <a:t> </a:t>
+            </a:r>
+            <a:r>
+              <a:rPr lang="sv-SE" sz="3600" dirty="0" err="1"/>
+              <a:t>solving</a:t>
+            </a:r>
+            <a:r>
+              <a:rPr lang="sv-SE" sz="3600" dirty="0"/>
+              <a:t>, </a:t>
+            </a:r>
+            <a:r>
+              <a:rPr lang="sv-SE" sz="3600" dirty="0" err="1"/>
+              <a:t>using</a:t>
+            </a:r>
+            <a:r>
+              <a:rPr lang="sv-SE" sz="3600" dirty="0"/>
+              <a:t> </a:t>
+            </a:r>
+            <a:r>
+              <a:rPr lang="sv-SE" sz="3600" dirty="0" err="1"/>
+              <a:t>interior</a:t>
+            </a:r>
+            <a:r>
+              <a:rPr lang="sv-SE" sz="3600" dirty="0"/>
+              <a:t> </a:t>
+            </a:r>
+            <a:r>
+              <a:rPr lang="sv-SE" sz="3600" dirty="0" err="1"/>
+              <a:t>point</a:t>
+            </a:r>
+            <a:r>
+              <a:rPr lang="sv-SE" sz="3600" dirty="0"/>
+              <a:t>, </a:t>
+            </a:r>
+          </a:p>
+        </p:txBody>
+      </p:sp>
+      <p:sp>
+        <p:nvSpPr>
+          <p:cNvPr id="18" name="TextBox 17">
+            <a:extLst>
+              <a:ext uri="{FF2B5EF4-FFF2-40B4-BE49-F238E27FC236}">
+                <a16:creationId xmlns:a16="http://schemas.microsoft.com/office/drawing/2014/main" id="{F536598D-4EB2-C650-D889-074A13970BEE}"/>
+              </a:ext>
+            </a:extLst>
+          </p:cNvPr>
+          <p:cNvSpPr txBox="1"/>
+          <p:nvPr/>
+        </p:nvSpPr>
+        <p:spPr>
+          <a:xfrm>
+            <a:off x="134296" y="14444948"/>
+            <a:ext cx="7401706" cy="1200329"/>
+          </a:xfrm>
+          <a:prstGeom prst="rect">
+            <a:avLst/>
+          </a:prstGeom>
+          <a:noFill/>
+        </p:spPr>
+        <p:txBody>
+          <a:bodyPr wrap="square" rtlCol="0">
+            <a:spAutoFit/>
+          </a:bodyPr>
+          <a:lstStyle/>
+          <a:p>
+            <a:r>
+              <a:rPr lang="sv-SE" sz="3600" dirty="0" err="1"/>
+              <a:t>Phase</a:t>
+            </a:r>
+            <a:r>
+              <a:rPr lang="sv-SE" sz="3600" dirty="0"/>
+              <a:t> II </a:t>
+            </a:r>
+            <a:r>
+              <a:rPr lang="sv-SE" sz="3600" dirty="0" err="1"/>
+              <a:t>then</a:t>
+            </a:r>
+            <a:r>
+              <a:rPr lang="sv-SE" sz="3600" dirty="0"/>
+              <a:t> </a:t>
+            </a:r>
+            <a:r>
+              <a:rPr lang="sv-SE" sz="3600" dirty="0" err="1"/>
+              <a:t>solved</a:t>
+            </a:r>
+            <a:r>
+              <a:rPr lang="sv-SE" sz="3600" dirty="0"/>
+              <a:t> the problem by </a:t>
+            </a:r>
+            <a:r>
+              <a:rPr lang="sv-SE" sz="3600" dirty="0" err="1"/>
+              <a:t>solving</a:t>
+            </a:r>
+            <a:endParaRPr lang="sv-SE" sz="3600" dirty="0"/>
+          </a:p>
+        </p:txBody>
+      </p:sp>
+      <p:pic>
+        <p:nvPicPr>
+          <p:cNvPr id="28" name="Picture 27" descr="A black text on a white background&#10;&#10;Description automatically generated">
+            <a:extLst>
+              <a:ext uri="{FF2B5EF4-FFF2-40B4-BE49-F238E27FC236}">
+                <a16:creationId xmlns:a16="http://schemas.microsoft.com/office/drawing/2014/main" id="{1EF0737E-382C-A656-FC0E-1565A7DA4952}"/>
+              </a:ext>
+            </a:extLst>
+          </p:cNvPr>
+          <p:cNvPicPr>
+            <a:picLocks noChangeAspect="1"/>
+          </p:cNvPicPr>
+          <p:nvPr/>
+        </p:nvPicPr>
+        <p:blipFill>
+          <a:blip r:embed="rId4"/>
+          <a:stretch>
+            <a:fillRect/>
+          </a:stretch>
+        </p:blipFill>
+        <p:spPr>
+          <a:xfrm>
+            <a:off x="-224227" y="12654343"/>
+            <a:ext cx="8323385" cy="1371820"/>
+          </a:xfrm>
+          <a:prstGeom prst="rect">
+            <a:avLst/>
+          </a:prstGeom>
+        </p:spPr>
+      </p:pic>
+      <p:pic>
+        <p:nvPicPr>
+          <p:cNvPr id="32" name="Picture 31">
+            <a:extLst>
+              <a:ext uri="{FF2B5EF4-FFF2-40B4-BE49-F238E27FC236}">
+                <a16:creationId xmlns:a16="http://schemas.microsoft.com/office/drawing/2014/main" id="{F6BAF546-EC5B-CC45-57C5-5450558A67ED}"/>
+              </a:ext>
+            </a:extLst>
+          </p:cNvPr>
+          <p:cNvPicPr>
+            <a:picLocks noChangeAspect="1"/>
+          </p:cNvPicPr>
+          <p:nvPr/>
+        </p:nvPicPr>
+        <p:blipFill>
+          <a:blip r:embed="rId5"/>
+          <a:stretch>
+            <a:fillRect/>
+          </a:stretch>
+        </p:blipFill>
+        <p:spPr>
+          <a:xfrm>
+            <a:off x="1" y="18205558"/>
+            <a:ext cx="4314091" cy="886784"/>
+          </a:xfrm>
+          <a:prstGeom prst="rect">
+            <a:avLst/>
+          </a:prstGeom>
+        </p:spPr>
+      </p:pic>
+      <p:pic>
+        <p:nvPicPr>
+          <p:cNvPr id="34" name="Picture 33" descr="A math equations on a white background&#10;&#10;Description automatically generated">
+            <a:extLst>
+              <a:ext uri="{FF2B5EF4-FFF2-40B4-BE49-F238E27FC236}">
+                <a16:creationId xmlns:a16="http://schemas.microsoft.com/office/drawing/2014/main" id="{FACEE865-995E-D492-0158-C8D0C435BD14}"/>
+              </a:ext>
+            </a:extLst>
+          </p:cNvPr>
+          <p:cNvPicPr>
+            <a:picLocks noChangeAspect="1"/>
+          </p:cNvPicPr>
+          <p:nvPr/>
+        </p:nvPicPr>
+        <p:blipFill>
+          <a:blip r:embed="rId6"/>
+          <a:stretch>
+            <a:fillRect/>
+          </a:stretch>
+        </p:blipFill>
+        <p:spPr>
+          <a:xfrm>
+            <a:off x="383291" y="16929851"/>
+            <a:ext cx="6715456" cy="1246582"/>
+          </a:xfrm>
+          <a:prstGeom prst="rect">
+            <a:avLst/>
+          </a:prstGeom>
+        </p:spPr>
+      </p:pic>
+      <p:pic>
+        <p:nvPicPr>
+          <p:cNvPr id="37" name="Picture 36" descr="A math symbols with a white background&#10;&#10;Description automatically generated with medium confidence">
+            <a:extLst>
+              <a:ext uri="{FF2B5EF4-FFF2-40B4-BE49-F238E27FC236}">
+                <a16:creationId xmlns:a16="http://schemas.microsoft.com/office/drawing/2014/main" id="{EAD581E8-21AE-5254-7388-16DAB12788F9}"/>
+              </a:ext>
+            </a:extLst>
+          </p:cNvPr>
+          <p:cNvPicPr>
+            <a:picLocks noChangeAspect="1"/>
+          </p:cNvPicPr>
+          <p:nvPr/>
+        </p:nvPicPr>
+        <p:blipFill>
+          <a:blip r:embed="rId7"/>
+          <a:stretch>
+            <a:fillRect/>
+          </a:stretch>
+        </p:blipFill>
+        <p:spPr>
+          <a:xfrm>
+            <a:off x="134296" y="15668580"/>
+            <a:ext cx="6964451" cy="1458181"/>
+          </a:xfrm>
+          <a:prstGeom prst="rect">
+            <a:avLst/>
+          </a:prstGeom>
+        </p:spPr>
+      </p:pic>
+      <p:sp>
+        <p:nvSpPr>
+          <p:cNvPr id="40" name="TextBox 39">
+            <a:extLst>
+              <a:ext uri="{FF2B5EF4-FFF2-40B4-BE49-F238E27FC236}">
+                <a16:creationId xmlns:a16="http://schemas.microsoft.com/office/drawing/2014/main" id="{5D12DB6D-37ED-75B0-B7DA-1379FB71037F}"/>
+              </a:ext>
+            </a:extLst>
+          </p:cNvPr>
+          <p:cNvSpPr txBox="1"/>
+          <p:nvPr/>
+        </p:nvSpPr>
+        <p:spPr>
+          <a:xfrm>
+            <a:off x="110479" y="19437704"/>
+            <a:ext cx="7978444" cy="2308324"/>
+          </a:xfrm>
+          <a:prstGeom prst="rect">
+            <a:avLst/>
+          </a:prstGeom>
+          <a:noFill/>
+        </p:spPr>
+        <p:txBody>
+          <a:bodyPr wrap="square" rtlCol="0">
+            <a:spAutoFit/>
+          </a:bodyPr>
+          <a:lstStyle/>
+          <a:p>
+            <a:r>
+              <a:rPr lang="sv-SE" sz="3600" dirty="0"/>
+              <a:t>The </a:t>
+            </a:r>
+            <a:r>
+              <a:rPr lang="sv-SE" sz="3600" dirty="0" err="1"/>
+              <a:t>extentions</a:t>
+            </a:r>
+            <a:r>
+              <a:rPr lang="sv-SE" sz="3600" dirty="0"/>
+              <a:t> to QP and SOCP </a:t>
+            </a:r>
+            <a:r>
+              <a:rPr lang="sv-SE" sz="3600" dirty="0" err="1"/>
+              <a:t>were</a:t>
+            </a:r>
+            <a:r>
+              <a:rPr lang="sv-SE" sz="3600" dirty="0"/>
+              <a:t> straight forward as </a:t>
+            </a:r>
+            <a:r>
+              <a:rPr lang="sv-SE" sz="3600" dirty="0" err="1"/>
+              <a:t>only</a:t>
+            </a:r>
+            <a:r>
+              <a:rPr lang="sv-SE" sz="3600" dirty="0"/>
+              <a:t> the gradient, </a:t>
+            </a:r>
+            <a:r>
+              <a:rPr lang="sv-SE" sz="3600" dirty="0" err="1"/>
+              <a:t>hessian</a:t>
+            </a:r>
+            <a:r>
+              <a:rPr lang="sv-SE" sz="3600" dirty="0"/>
+              <a:t> and </a:t>
+            </a:r>
+            <a:r>
+              <a:rPr lang="sv-SE" sz="3600" dirty="0" err="1"/>
+              <a:t>objective</a:t>
+            </a:r>
+            <a:r>
+              <a:rPr lang="sv-SE" sz="3600" dirty="0"/>
+              <a:t> </a:t>
+            </a:r>
+            <a:r>
+              <a:rPr lang="sv-SE" sz="3600" dirty="0" err="1"/>
+              <a:t>needed</a:t>
+            </a:r>
+            <a:r>
+              <a:rPr lang="sv-SE" sz="3600" dirty="0"/>
+              <a:t> to be </a:t>
+            </a:r>
+            <a:r>
+              <a:rPr lang="sv-SE" sz="3600" dirty="0" err="1"/>
+              <a:t>altered</a:t>
+            </a:r>
+            <a:r>
+              <a:rPr lang="sv-SE" sz="3600" dirty="0"/>
+              <a:t> </a:t>
+            </a:r>
+            <a:r>
+              <a:rPr lang="sv-SE" sz="3600" dirty="0" err="1"/>
+              <a:t>slightly</a:t>
+            </a:r>
+            <a:r>
+              <a:rPr lang="sv-SE" sz="3600" dirty="0"/>
+              <a:t>. </a:t>
+            </a:r>
+          </a:p>
+        </p:txBody>
+      </p:sp>
+      <p:sp>
+        <p:nvSpPr>
+          <p:cNvPr id="42" name="TextBox 41">
+            <a:extLst>
+              <a:ext uri="{FF2B5EF4-FFF2-40B4-BE49-F238E27FC236}">
+                <a16:creationId xmlns:a16="http://schemas.microsoft.com/office/drawing/2014/main" id="{4F2F7A2A-322B-D735-5EF6-389E8BC023E1}"/>
+              </a:ext>
+            </a:extLst>
+          </p:cNvPr>
+          <p:cNvSpPr txBox="1"/>
+          <p:nvPr/>
+        </p:nvSpPr>
+        <p:spPr>
+          <a:xfrm>
+            <a:off x="8685981" y="5161226"/>
+            <a:ext cx="10554519" cy="2862322"/>
+          </a:xfrm>
+          <a:prstGeom prst="rect">
+            <a:avLst/>
+          </a:prstGeom>
+          <a:noFill/>
+        </p:spPr>
+        <p:txBody>
+          <a:bodyPr wrap="square" rtlCol="0">
+            <a:spAutoFit/>
+          </a:bodyPr>
+          <a:lstStyle/>
+          <a:p>
+            <a:r>
+              <a:rPr lang="sv-SE" sz="3600" dirty="0" err="1"/>
+              <a:t>Two</a:t>
+            </a:r>
+            <a:r>
+              <a:rPr lang="sv-SE" sz="3600" dirty="0"/>
+              <a:t> </a:t>
+            </a:r>
+            <a:r>
+              <a:rPr lang="sv-SE" sz="3600" dirty="0" err="1"/>
+              <a:t>types</a:t>
+            </a:r>
+            <a:r>
+              <a:rPr lang="sv-SE" sz="3600" dirty="0"/>
+              <a:t> </a:t>
+            </a:r>
+            <a:r>
+              <a:rPr lang="sv-SE" sz="3600" dirty="0" err="1"/>
+              <a:t>of</a:t>
+            </a:r>
+            <a:r>
+              <a:rPr lang="sv-SE" sz="3600" dirty="0"/>
+              <a:t> </a:t>
+            </a:r>
+            <a:r>
+              <a:rPr lang="sv-SE" sz="3600" dirty="0" err="1"/>
+              <a:t>testing</a:t>
+            </a:r>
+            <a:r>
+              <a:rPr lang="sv-SE" sz="3600" dirty="0"/>
+              <a:t> </a:t>
+            </a:r>
+            <a:r>
+              <a:rPr lang="sv-SE" sz="3600" dirty="0" err="1"/>
+              <a:t>were</a:t>
+            </a:r>
+            <a:r>
+              <a:rPr lang="sv-SE" sz="3600" dirty="0"/>
+              <a:t> </a:t>
+            </a:r>
+            <a:r>
+              <a:rPr lang="sv-SE" sz="3600" dirty="0" err="1"/>
+              <a:t>conducted</a:t>
+            </a:r>
+            <a:r>
+              <a:rPr lang="sv-SE" sz="3600" dirty="0"/>
+              <a:t>, </a:t>
+            </a:r>
+            <a:r>
+              <a:rPr lang="sv-SE" sz="3600" dirty="0" err="1"/>
+              <a:t>one</a:t>
+            </a:r>
+            <a:r>
+              <a:rPr lang="sv-SE" sz="3600" dirty="0"/>
+              <a:t> </a:t>
+            </a:r>
+            <a:r>
+              <a:rPr lang="sv-SE" sz="3600" dirty="0" err="1"/>
+              <a:t>type</a:t>
+            </a:r>
+            <a:r>
+              <a:rPr lang="sv-SE" sz="3600" dirty="0"/>
+              <a:t> </a:t>
+            </a:r>
+            <a:r>
+              <a:rPr lang="sv-SE" sz="3600" dirty="0" err="1"/>
+              <a:t>was</a:t>
+            </a:r>
+            <a:r>
+              <a:rPr lang="sv-SE" sz="3600" dirty="0"/>
+              <a:t> </a:t>
+            </a:r>
+            <a:r>
+              <a:rPr lang="sv-SE" sz="3600" dirty="0" err="1"/>
+              <a:t>relaxed</a:t>
+            </a:r>
+            <a:r>
+              <a:rPr lang="sv-SE" sz="3600" dirty="0"/>
+              <a:t> </a:t>
+            </a:r>
+            <a:r>
+              <a:rPr lang="sv-SE" sz="3600" dirty="0" err="1"/>
+              <a:t>integer</a:t>
+            </a:r>
+            <a:r>
+              <a:rPr lang="sv-SE" sz="3600" dirty="0"/>
+              <a:t> problems from MIPLIB and the </a:t>
+            </a:r>
+            <a:r>
+              <a:rPr lang="sv-SE" sz="3600" dirty="0" err="1"/>
+              <a:t>other</a:t>
+            </a:r>
+            <a:r>
+              <a:rPr lang="sv-SE" sz="3600" dirty="0"/>
+              <a:t> </a:t>
+            </a:r>
+            <a:r>
+              <a:rPr lang="sv-SE" sz="3600" dirty="0" err="1"/>
+              <a:t>was</a:t>
+            </a:r>
+            <a:r>
+              <a:rPr lang="sv-SE" sz="3600" dirty="0"/>
+              <a:t> </a:t>
+            </a:r>
+            <a:r>
+              <a:rPr lang="sv-SE" sz="3600" dirty="0" err="1"/>
+              <a:t>randomly</a:t>
+            </a:r>
+            <a:r>
+              <a:rPr lang="sv-SE" sz="3600" dirty="0"/>
+              <a:t> </a:t>
+            </a:r>
+            <a:r>
+              <a:rPr lang="sv-SE" sz="3600" dirty="0" err="1"/>
+              <a:t>generated</a:t>
+            </a:r>
+            <a:r>
+              <a:rPr lang="sv-SE" sz="3600" dirty="0"/>
+              <a:t> data from </a:t>
+            </a:r>
+            <a:r>
+              <a:rPr lang="sv-SE" sz="3600" dirty="0" err="1"/>
+              <a:t>Numpy</a:t>
+            </a:r>
+            <a:r>
+              <a:rPr lang="sv-SE" sz="3600" dirty="0"/>
+              <a:t>. MIPLIB </a:t>
+            </a:r>
+            <a:r>
+              <a:rPr lang="sv-SE" sz="3600" dirty="0" err="1"/>
+              <a:t>was</a:t>
+            </a:r>
+            <a:r>
+              <a:rPr lang="sv-SE" sz="3600" dirty="0"/>
+              <a:t> in general </a:t>
+            </a:r>
+            <a:r>
+              <a:rPr lang="sv-SE" sz="3600" dirty="0" err="1"/>
+              <a:t>very</a:t>
+            </a:r>
+            <a:r>
+              <a:rPr lang="sv-SE" sz="3600" dirty="0"/>
+              <a:t> </a:t>
+            </a:r>
+            <a:r>
+              <a:rPr lang="sv-SE" sz="3600" dirty="0" err="1"/>
+              <a:t>sparse</a:t>
+            </a:r>
+            <a:r>
+              <a:rPr lang="sv-SE" sz="3600" dirty="0"/>
+              <a:t> and </a:t>
+            </a:r>
+            <a:r>
+              <a:rPr lang="sv-SE" sz="3600" dirty="0" err="1"/>
+              <a:t>generated</a:t>
+            </a:r>
+            <a:r>
+              <a:rPr lang="sv-SE" sz="3600" dirty="0"/>
+              <a:t> data </a:t>
+            </a:r>
+            <a:r>
+              <a:rPr lang="sv-SE" sz="3600" dirty="0" err="1"/>
+              <a:t>was</a:t>
+            </a:r>
+            <a:r>
+              <a:rPr lang="sv-SE" sz="3600" dirty="0"/>
+              <a:t> in general </a:t>
+            </a:r>
+            <a:r>
+              <a:rPr lang="sv-SE" sz="3600" dirty="0" err="1"/>
+              <a:t>dense</a:t>
+            </a:r>
+            <a:r>
+              <a:rPr lang="sv-SE" sz="3600" dirty="0"/>
+              <a:t>. </a:t>
+            </a:r>
+          </a:p>
+        </p:txBody>
+      </p:sp>
+      <p:pic>
+        <p:nvPicPr>
+          <p:cNvPr id="14" name="Picture 13" descr="A graph of average solving times for lp&#10;&#10;Description automatically generated">
+            <a:extLst>
+              <a:ext uri="{FF2B5EF4-FFF2-40B4-BE49-F238E27FC236}">
+                <a16:creationId xmlns:a16="http://schemas.microsoft.com/office/drawing/2014/main" id="{E5A82373-E402-7A91-90D0-A47C128EEEA8}"/>
+              </a:ext>
+            </a:extLst>
+          </p:cNvPr>
+          <p:cNvPicPr>
+            <a:picLocks noChangeAspect="1"/>
+          </p:cNvPicPr>
+          <p:nvPr/>
+        </p:nvPicPr>
+        <p:blipFill>
+          <a:blip r:embed="rId8"/>
+          <a:stretch>
+            <a:fillRect/>
+          </a:stretch>
+        </p:blipFill>
+        <p:spPr>
+          <a:xfrm>
+            <a:off x="8441346" y="10393220"/>
+            <a:ext cx="11562058" cy="5781029"/>
+          </a:xfrm>
+          <a:prstGeom prst="rect">
+            <a:avLst/>
+          </a:prstGeom>
+        </p:spPr>
+      </p:pic>
+      <p:pic>
+        <p:nvPicPr>
+          <p:cNvPr id="16" name="Picture 15">
+            <a:extLst>
+              <a:ext uri="{FF2B5EF4-FFF2-40B4-BE49-F238E27FC236}">
+                <a16:creationId xmlns:a16="http://schemas.microsoft.com/office/drawing/2014/main" id="{BAAE7B4E-776F-8A89-B097-B9B58340B146}"/>
+              </a:ext>
+            </a:extLst>
+          </p:cNvPr>
+          <p:cNvPicPr>
+            <a:picLocks noChangeAspect="1"/>
+          </p:cNvPicPr>
+          <p:nvPr/>
+        </p:nvPicPr>
+        <p:blipFill>
+          <a:blip r:embed="rId9"/>
+          <a:stretch>
+            <a:fillRect/>
+          </a:stretch>
+        </p:blipFill>
+        <p:spPr>
+          <a:xfrm>
+            <a:off x="8441346" y="16052642"/>
+            <a:ext cx="11562058" cy="5781029"/>
+          </a:xfrm>
+          <a:prstGeom prst="rect">
+            <a:avLst/>
+          </a:prstGeom>
+        </p:spPr>
+      </p:pic>
+      <p:sp>
+        <p:nvSpPr>
+          <p:cNvPr id="17" name="TextBox 16">
+            <a:extLst>
+              <a:ext uri="{FF2B5EF4-FFF2-40B4-BE49-F238E27FC236}">
+                <a16:creationId xmlns:a16="http://schemas.microsoft.com/office/drawing/2014/main" id="{2022FDBB-7DE6-D33A-44CB-E094C2B0DF71}"/>
+              </a:ext>
+            </a:extLst>
+          </p:cNvPr>
+          <p:cNvSpPr txBox="1"/>
+          <p:nvPr/>
+        </p:nvSpPr>
+        <p:spPr>
+          <a:xfrm>
+            <a:off x="8745044" y="8979177"/>
+            <a:ext cx="10171605" cy="1754326"/>
+          </a:xfrm>
+          <a:prstGeom prst="rect">
+            <a:avLst/>
+          </a:prstGeom>
+          <a:noFill/>
+        </p:spPr>
+        <p:txBody>
+          <a:bodyPr wrap="square" rtlCol="0">
+            <a:spAutoFit/>
+          </a:bodyPr>
+          <a:lstStyle/>
+          <a:p>
+            <a:r>
+              <a:rPr lang="sv-SE" sz="3600" dirty="0"/>
+              <a:t>In the </a:t>
+            </a:r>
+            <a:r>
+              <a:rPr lang="sv-SE" sz="3600" dirty="0" err="1"/>
+              <a:t>case</a:t>
+            </a:r>
+            <a:r>
+              <a:rPr lang="sv-SE" sz="3600" dirty="0"/>
+              <a:t> </a:t>
+            </a:r>
+            <a:r>
+              <a:rPr lang="sv-SE" sz="3600" dirty="0" err="1"/>
+              <a:t>of</a:t>
+            </a:r>
+            <a:r>
+              <a:rPr lang="sv-SE" sz="3600" dirty="0"/>
+              <a:t> LP-problems, a </a:t>
+            </a:r>
+            <a:r>
+              <a:rPr lang="sv-SE" sz="3600" dirty="0" err="1"/>
+              <a:t>big</a:t>
+            </a:r>
+            <a:r>
+              <a:rPr lang="sv-SE" sz="3600" dirty="0"/>
+              <a:t> </a:t>
+            </a:r>
+            <a:r>
+              <a:rPr lang="sv-SE" sz="3600" dirty="0" err="1"/>
+              <a:t>difference</a:t>
+            </a:r>
+            <a:r>
+              <a:rPr lang="sv-SE" sz="3600" dirty="0"/>
+              <a:t> </a:t>
+            </a:r>
+            <a:r>
+              <a:rPr lang="sv-SE" sz="3600" dirty="0" err="1"/>
+              <a:t>can</a:t>
+            </a:r>
+            <a:r>
+              <a:rPr lang="sv-SE" sz="3600" dirty="0"/>
+              <a:t> be </a:t>
+            </a:r>
+            <a:r>
+              <a:rPr lang="sv-SE" sz="3600" dirty="0" err="1"/>
+              <a:t>seen</a:t>
+            </a:r>
+            <a:r>
+              <a:rPr lang="sv-SE" sz="3600" dirty="0"/>
+              <a:t> in </a:t>
+            </a:r>
+            <a:r>
+              <a:rPr lang="sv-SE" sz="3600" dirty="0" err="1"/>
+              <a:t>time</a:t>
+            </a:r>
+            <a:r>
+              <a:rPr lang="sv-SE" sz="3600" dirty="0"/>
+              <a:t> </a:t>
+            </a:r>
+            <a:r>
+              <a:rPr lang="sv-SE" sz="3600" dirty="0" err="1"/>
+              <a:t>compared</a:t>
+            </a:r>
+            <a:r>
+              <a:rPr lang="sv-SE" sz="3600" dirty="0"/>
+              <a:t> to CVXPY </a:t>
+            </a:r>
+            <a:r>
+              <a:rPr lang="sv-SE" sz="3600" dirty="0" err="1"/>
+              <a:t>while</a:t>
+            </a:r>
+            <a:r>
+              <a:rPr lang="sv-SE" sz="3600" dirty="0"/>
+              <a:t> the </a:t>
+            </a:r>
+            <a:r>
+              <a:rPr lang="sv-SE" sz="3600" dirty="0" err="1"/>
+              <a:t>time</a:t>
+            </a:r>
+            <a:r>
+              <a:rPr lang="sv-SE" sz="3600" dirty="0"/>
+              <a:t> </a:t>
+            </a:r>
+            <a:r>
+              <a:rPr lang="sv-SE" sz="3600" dirty="0" err="1"/>
+              <a:t>consumtion</a:t>
+            </a:r>
+            <a:r>
+              <a:rPr lang="sv-SE" sz="3600" dirty="0"/>
+              <a:t> is on the same order as JAX.</a:t>
+            </a:r>
+          </a:p>
+        </p:txBody>
+      </p:sp>
+      <p:graphicFrame>
+        <p:nvGraphicFramePr>
+          <p:cNvPr id="22" name="Table 21">
+            <a:extLst>
+              <a:ext uri="{FF2B5EF4-FFF2-40B4-BE49-F238E27FC236}">
+                <a16:creationId xmlns:a16="http://schemas.microsoft.com/office/drawing/2014/main" id="{F8C74995-2FB0-59FD-D8C9-01C82822BE91}"/>
+              </a:ext>
+            </a:extLst>
+          </p:cNvPr>
+          <p:cNvGraphicFramePr>
+            <a:graphicFrameLocks noGrp="1"/>
+          </p:cNvGraphicFramePr>
+          <p:nvPr>
+            <p:extLst>
+              <p:ext uri="{D42A27DB-BD31-4B8C-83A1-F6EECF244321}">
+                <p14:modId xmlns:p14="http://schemas.microsoft.com/office/powerpoint/2010/main" val="609863617"/>
+              </p:ext>
+            </p:extLst>
+          </p:nvPr>
+        </p:nvGraphicFramePr>
+        <p:xfrm>
+          <a:off x="19837558" y="7267247"/>
+          <a:ext cx="12748851" cy="1920240"/>
+        </p:xfrm>
+        <a:graphic>
+          <a:graphicData uri="http://schemas.openxmlformats.org/drawingml/2006/table">
+            <a:tbl>
+              <a:tblPr firstRow="1" bandRow="1">
+                <a:tableStyleId>{D7AC3CCA-C797-4891-BE02-D94E43425B78}</a:tableStyleId>
+              </a:tblPr>
+              <a:tblGrid>
+                <a:gridCol w="2937541">
+                  <a:extLst>
+                    <a:ext uri="{9D8B030D-6E8A-4147-A177-3AD203B41FA5}">
+                      <a16:colId xmlns:a16="http://schemas.microsoft.com/office/drawing/2014/main" val="1385499232"/>
+                    </a:ext>
+                  </a:extLst>
+                </a:gridCol>
+                <a:gridCol w="1829035">
+                  <a:extLst>
+                    <a:ext uri="{9D8B030D-6E8A-4147-A177-3AD203B41FA5}">
+                      <a16:colId xmlns:a16="http://schemas.microsoft.com/office/drawing/2014/main" val="3635129827"/>
+                    </a:ext>
+                  </a:extLst>
+                </a:gridCol>
+                <a:gridCol w="4009097">
+                  <a:extLst>
+                    <a:ext uri="{9D8B030D-6E8A-4147-A177-3AD203B41FA5}">
+                      <a16:colId xmlns:a16="http://schemas.microsoft.com/office/drawing/2014/main" val="58010072"/>
+                    </a:ext>
+                  </a:extLst>
+                </a:gridCol>
+                <a:gridCol w="3973178">
+                  <a:extLst>
+                    <a:ext uri="{9D8B030D-6E8A-4147-A177-3AD203B41FA5}">
+                      <a16:colId xmlns:a16="http://schemas.microsoft.com/office/drawing/2014/main" val="3279958761"/>
+                    </a:ext>
+                  </a:extLst>
+                </a:gridCol>
+              </a:tblGrid>
+              <a:tr h="370840">
+                <a:tc>
+                  <a:txBody>
+                    <a:bodyPr/>
+                    <a:lstStyle/>
+                    <a:p>
+                      <a:r>
+                        <a:rPr lang="sv-SE" sz="3600" b="0" dirty="0" err="1"/>
+                        <a:t>Solver</a:t>
+                      </a:r>
+                      <a:endParaRPr lang="sv-SE" sz="3600" b="0" dirty="0"/>
+                    </a:p>
+                  </a:txBody>
+                  <a:tcPr/>
+                </a:tc>
+                <a:tc>
+                  <a:txBody>
+                    <a:bodyPr/>
+                    <a:lstStyle/>
+                    <a:p>
+                      <a:r>
+                        <a:rPr lang="sv-SE" sz="3600" b="0" dirty="0"/>
+                        <a:t>CVXPY</a:t>
+                      </a:r>
+                    </a:p>
+                  </a:txBody>
+                  <a:tcPr/>
+                </a:tc>
+                <a:tc>
+                  <a:txBody>
+                    <a:bodyPr/>
+                    <a:lstStyle/>
+                    <a:p>
+                      <a:r>
+                        <a:rPr lang="sv-SE" sz="3600" b="0" dirty="0"/>
+                        <a:t>LP-</a:t>
+                      </a:r>
+                      <a:r>
+                        <a:rPr lang="sv-SE" sz="3600" b="0" dirty="0" err="1"/>
+                        <a:t>solver</a:t>
+                      </a:r>
+                      <a:r>
+                        <a:rPr lang="sv-SE" sz="3600" b="0" dirty="0"/>
+                        <a:t> </a:t>
+                      </a:r>
+                      <a:r>
+                        <a:rPr lang="sv-SE" sz="3600" b="0" dirty="0" err="1"/>
+                        <a:t>using</a:t>
+                      </a:r>
+                      <a:r>
+                        <a:rPr lang="sv-SE" sz="3600" b="0" dirty="0"/>
+                        <a:t> GPU</a:t>
+                      </a:r>
+                    </a:p>
+                  </a:txBody>
+                  <a:tcPr/>
+                </a:tc>
+                <a:tc>
+                  <a:txBody>
+                    <a:bodyPr/>
+                    <a:lstStyle/>
+                    <a:p>
+                      <a:r>
+                        <a:rPr lang="sv-SE" sz="3600" b="0" dirty="0"/>
+                        <a:t>LP-</a:t>
+                      </a:r>
+                      <a:r>
+                        <a:rPr lang="sv-SE" sz="3600" b="0" dirty="0" err="1"/>
+                        <a:t>solver</a:t>
+                      </a:r>
+                      <a:r>
+                        <a:rPr lang="sv-SE" sz="3600" b="0" dirty="0"/>
+                        <a:t> </a:t>
+                      </a:r>
+                      <a:r>
+                        <a:rPr lang="sv-SE" sz="3600" b="0" dirty="0" err="1"/>
+                        <a:t>using</a:t>
+                      </a:r>
+                      <a:r>
+                        <a:rPr lang="sv-SE" sz="3600" b="0" dirty="0"/>
+                        <a:t> CPU</a:t>
+                      </a:r>
+                    </a:p>
+                  </a:txBody>
+                  <a:tcPr/>
+                </a:tc>
+                <a:extLst>
+                  <a:ext uri="{0D108BD9-81ED-4DB2-BD59-A6C34878D82A}">
+                    <a16:rowId xmlns:a16="http://schemas.microsoft.com/office/drawing/2014/main" val="760780240"/>
+                  </a:ext>
+                </a:extLst>
+              </a:tr>
+              <a:tr h="370840">
+                <a:tc>
+                  <a:txBody>
+                    <a:bodyPr/>
+                    <a:lstStyle/>
+                    <a:p>
+                      <a:r>
+                        <a:rPr lang="sv-SE" sz="3600" b="0" dirty="0"/>
+                        <a:t>505 </a:t>
+                      </a:r>
+                      <a:r>
+                        <a:rPr lang="sv-SE" sz="3600" b="0" dirty="0" err="1"/>
+                        <a:t>variables</a:t>
+                      </a:r>
+                      <a:endParaRPr lang="sv-SE" sz="3600" b="0" dirty="0"/>
+                    </a:p>
+                  </a:txBody>
+                  <a:tcPr/>
+                </a:tc>
+                <a:tc>
+                  <a:txBody>
+                    <a:bodyPr/>
+                    <a:lstStyle/>
+                    <a:p>
+                      <a:r>
+                        <a:rPr lang="sv-SE" sz="3600" b="0" dirty="0"/>
+                        <a:t>0.0283 s</a:t>
+                      </a:r>
+                    </a:p>
+                  </a:txBody>
+                  <a:tcPr/>
+                </a:tc>
+                <a:tc>
+                  <a:txBody>
+                    <a:bodyPr/>
+                    <a:lstStyle/>
+                    <a:p>
+                      <a:r>
+                        <a:rPr lang="sv-SE" sz="3600" b="0" dirty="0"/>
+                        <a:t>2.52 s</a:t>
+                      </a:r>
+                    </a:p>
+                  </a:txBody>
+                  <a:tcPr/>
+                </a:tc>
+                <a:tc>
+                  <a:txBody>
+                    <a:bodyPr/>
+                    <a:lstStyle/>
+                    <a:p>
+                      <a:r>
+                        <a:rPr lang="sv-SE" sz="3600" b="0" dirty="0"/>
+                        <a:t>3.63 s</a:t>
+                      </a:r>
+                    </a:p>
+                  </a:txBody>
+                  <a:tcPr/>
+                </a:tc>
+                <a:extLst>
+                  <a:ext uri="{0D108BD9-81ED-4DB2-BD59-A6C34878D82A}">
+                    <a16:rowId xmlns:a16="http://schemas.microsoft.com/office/drawing/2014/main" val="2759210537"/>
+                  </a:ext>
+                </a:extLst>
+              </a:tr>
+              <a:tr h="370840">
+                <a:tc>
+                  <a:txBody>
+                    <a:bodyPr/>
+                    <a:lstStyle/>
+                    <a:p>
+                      <a:r>
+                        <a:rPr lang="sv-SE" sz="3600" b="0" dirty="0"/>
+                        <a:t>2728 </a:t>
+                      </a:r>
+                      <a:r>
+                        <a:rPr lang="sv-SE" sz="3600" b="0" dirty="0" err="1"/>
+                        <a:t>variables</a:t>
+                      </a:r>
+                      <a:endParaRPr lang="sv-SE" sz="3600" b="0" dirty="0"/>
+                    </a:p>
+                  </a:txBody>
+                  <a:tcPr/>
+                </a:tc>
+                <a:tc>
+                  <a:txBody>
+                    <a:bodyPr/>
+                    <a:lstStyle/>
+                    <a:p>
+                      <a:r>
+                        <a:rPr lang="sv-SE" sz="3600" b="0" dirty="0"/>
+                        <a:t>0.128 s</a:t>
+                      </a:r>
+                    </a:p>
+                  </a:txBody>
+                  <a:tcPr/>
+                </a:tc>
+                <a:tc>
+                  <a:txBody>
+                    <a:bodyPr/>
+                    <a:lstStyle/>
+                    <a:p>
+                      <a:r>
+                        <a:rPr lang="sv-SE" sz="3600" b="0" dirty="0"/>
+                        <a:t>5.41 s</a:t>
+                      </a:r>
+                    </a:p>
+                  </a:txBody>
+                  <a:tcPr/>
+                </a:tc>
+                <a:tc>
+                  <a:txBody>
+                    <a:bodyPr/>
+                    <a:lstStyle/>
+                    <a:p>
+                      <a:r>
+                        <a:rPr lang="sv-SE" sz="3600" b="0" dirty="0"/>
+                        <a:t>N/A</a:t>
+                      </a:r>
+                    </a:p>
+                  </a:txBody>
+                  <a:tcPr/>
+                </a:tc>
+                <a:extLst>
+                  <a:ext uri="{0D108BD9-81ED-4DB2-BD59-A6C34878D82A}">
+                    <a16:rowId xmlns:a16="http://schemas.microsoft.com/office/drawing/2014/main" val="2472415396"/>
+                  </a:ext>
+                </a:extLst>
+              </a:tr>
+            </a:tbl>
+          </a:graphicData>
+        </a:graphic>
+      </p:graphicFrame>
+      <p:sp>
+        <p:nvSpPr>
+          <p:cNvPr id="24" name="TextBox 23">
+            <a:extLst>
+              <a:ext uri="{FF2B5EF4-FFF2-40B4-BE49-F238E27FC236}">
+                <a16:creationId xmlns:a16="http://schemas.microsoft.com/office/drawing/2014/main" id="{F32F7D48-C9B5-2084-9F33-10DE8237AD20}"/>
+              </a:ext>
+            </a:extLst>
+          </p:cNvPr>
+          <p:cNvSpPr txBox="1"/>
+          <p:nvPr/>
+        </p:nvSpPr>
+        <p:spPr>
+          <a:xfrm>
+            <a:off x="19896622" y="5223660"/>
+            <a:ext cx="10036532" cy="1754326"/>
+          </a:xfrm>
+          <a:prstGeom prst="rect">
+            <a:avLst/>
+          </a:prstGeom>
+          <a:noFill/>
+        </p:spPr>
+        <p:txBody>
+          <a:bodyPr wrap="square" rtlCol="0">
+            <a:spAutoFit/>
+          </a:bodyPr>
+          <a:lstStyle/>
+          <a:p>
+            <a:r>
+              <a:rPr lang="sv-SE" sz="3600" dirty="0"/>
+              <a:t>In the </a:t>
+            </a:r>
+            <a:r>
+              <a:rPr lang="sv-SE" sz="3600" dirty="0" err="1"/>
+              <a:t>case</a:t>
+            </a:r>
+            <a:r>
+              <a:rPr lang="sv-SE" sz="3600" dirty="0"/>
+              <a:t> </a:t>
+            </a:r>
+            <a:r>
+              <a:rPr lang="sv-SE" sz="3600" dirty="0" err="1"/>
+              <a:t>of</a:t>
+            </a:r>
+            <a:r>
+              <a:rPr lang="sv-SE" sz="3600" dirty="0"/>
+              <a:t> a </a:t>
+            </a:r>
+            <a:r>
+              <a:rPr lang="sv-SE" sz="3600" dirty="0" err="1"/>
+              <a:t>sparse</a:t>
+            </a:r>
+            <a:r>
+              <a:rPr lang="sv-SE" sz="3600" dirty="0"/>
+              <a:t> problem, the LP-</a:t>
+            </a:r>
+            <a:r>
+              <a:rPr lang="sv-SE" sz="3600" dirty="0" err="1"/>
+              <a:t>solver</a:t>
+            </a:r>
+            <a:r>
+              <a:rPr lang="sv-SE" sz="3600" dirty="0"/>
+              <a:t> </a:t>
+            </a:r>
+            <a:r>
+              <a:rPr lang="sv-SE" sz="3600" dirty="0" err="1"/>
+              <a:t>stands</a:t>
+            </a:r>
+            <a:r>
+              <a:rPr lang="sv-SE" sz="3600" dirty="0"/>
+              <a:t> no </a:t>
+            </a:r>
+            <a:r>
+              <a:rPr lang="sv-SE" sz="3600" dirty="0" err="1"/>
+              <a:t>chance</a:t>
+            </a:r>
+            <a:r>
+              <a:rPr lang="sv-SE" sz="3600" dirty="0"/>
+              <a:t> </a:t>
+            </a:r>
+            <a:r>
+              <a:rPr lang="sv-SE" sz="3600" dirty="0" err="1"/>
+              <a:t>against</a:t>
+            </a:r>
+            <a:r>
+              <a:rPr lang="sv-SE" sz="3600" dirty="0"/>
+              <a:t> CVXPY </a:t>
+            </a:r>
+            <a:r>
+              <a:rPr lang="sv-SE" sz="3600" dirty="0" err="1"/>
+              <a:t>which</a:t>
+            </a:r>
+            <a:r>
+              <a:rPr lang="sv-SE" sz="3600" dirty="0"/>
+              <a:t> </a:t>
+            </a:r>
+            <a:r>
+              <a:rPr lang="sv-SE" sz="3600" dirty="0" err="1"/>
+              <a:t>utilized</a:t>
+            </a:r>
+            <a:r>
+              <a:rPr lang="sv-SE" sz="3600" dirty="0"/>
+              <a:t> the </a:t>
+            </a:r>
+            <a:r>
+              <a:rPr lang="sv-SE" sz="3600" dirty="0" err="1"/>
+              <a:t>scipy.linalg.sparse</a:t>
+            </a:r>
+            <a:r>
+              <a:rPr lang="sv-SE" sz="3600" dirty="0"/>
+              <a:t> </a:t>
+            </a:r>
+            <a:r>
+              <a:rPr lang="sv-SE" sz="3600" dirty="0" err="1"/>
+              <a:t>library</a:t>
+            </a:r>
+            <a:r>
+              <a:rPr lang="sv-SE" sz="3600" dirty="0"/>
+              <a:t>.</a:t>
+            </a:r>
+          </a:p>
+        </p:txBody>
+      </p:sp>
     </p:spTree>
     <p:extLst>
       <p:ext uri="{BB962C8B-B14F-4D97-AF65-F5344CB8AC3E}">

</xml_diff>